<commit_message>
Updates the shared_context module with speaker notes and concepts
I added slide that visually shows the components being composed
in the shared_context. Lots of speaker notes to accompany this
content.

Signed-off-by: Franklin Webber <franklin@chef.io>
</commit_message>
<xml_diff>
--- a/06-shared_context.pptx
+++ b/06-shared_context.pptx
@@ -16,10 +16,10 @@
     <p:sldId id="583" r:id="rId8"/>
     <p:sldId id="590" r:id="rId9"/>
     <p:sldId id="601" r:id="rId10"/>
-    <p:sldId id="600" r:id="rId11"/>
-    <p:sldId id="605" r:id="rId12"/>
-    <p:sldId id="597" r:id="rId13"/>
-    <p:sldId id="604" r:id="rId14"/>
+    <p:sldId id="606" r:id="rId11"/>
+    <p:sldId id="600" r:id="rId12"/>
+    <p:sldId id="605" r:id="rId13"/>
+    <p:sldId id="597" r:id="rId14"/>
     <p:sldId id="602" r:id="rId15"/>
     <p:sldId id="603" r:id="rId16"/>
     <p:sldId id="598" r:id="rId17"/>
@@ -156,13 +156,18 @@
   </p:defaultTextStyle>
   <p:extLst>
     <p:ext uri="{EFAFB233-063F-42B5-8137-9DF3F51BA10A}">
-      <p15:sldGuideLst xmlns="" xmlns:p15="http://schemas.microsoft.com/office/powerpoint/2012/main">
+      <p15:sldGuideLst xmlns:p15="http://schemas.microsoft.com/office/powerpoint/2012/main">
         <p15:guide id="1" orient="horz" pos="894">
           <p15:clr>
             <a:srgbClr val="A4A3A4"/>
           </p15:clr>
         </p15:guide>
-        <p15:guide id="2" pos="5024" userDrawn="1">
+        <p15:guide id="2" pos="752" userDrawn="1">
+          <p15:clr>
+            <a:srgbClr val="A4A3A4"/>
+          </p15:clr>
+        </p15:guide>
+        <p15:guide id="3" pos="6747">
           <p15:clr>
             <a:srgbClr val="A4A3A4"/>
           </p15:clr>
@@ -170,7 +175,7 @@
       </p15:sldGuideLst>
     </p:ext>
     <p:ext uri="{2D200454-40CA-4A62-9FC3-DE9A4176ACB9}">
-      <p15:notesGuideLst xmlns="" xmlns:p15="http://schemas.microsoft.com/office/powerpoint/2012/main"/>
+      <p15:notesGuideLst xmlns:p15="http://schemas.microsoft.com/office/powerpoint/2012/main"/>
     </p:ext>
   </p:extLst>
 </p:presentation>
@@ -238,6 +243,10 @@
             <a:pPr>
               <a:defRPr/>
             </a:pPr>
+            <a:r>
+              <a:rPr lang="en-US" smtClean="0"/>
+              <a:t>Elegant Tests</a:t>
+            </a:r>
             <a:endParaRPr lang="en-US"/>
           </a:p>
         </p:txBody>
@@ -282,13 +291,10 @@
             <a:pPr>
               <a:defRPr/>
             </a:pPr>
-            <a:fld id="{04CB1577-BF96-2D40-B4CA-2BF6DA80CBA7}" type="datetime1">
-              <a:rPr lang="en-CA"/>
-              <a:pPr>
-                <a:defRPr/>
-              </a:pPr>
-              <a:t>10/25/16</a:t>
-            </a:fld>
+            <a:r>
+              <a:rPr lang="en-US" smtClean="0"/>
+              <a:t>Chef Software, Inc.</a:t>
+            </a:r>
             <a:endParaRPr lang="en-US" dirty="0"/>
           </a:p>
         </p:txBody>
@@ -399,7 +405,7 @@
     </p:extLst>
   </p:cSld>
   <p:clrMap bg1="lt1" tx1="dk1" bg2="lt2" tx2="dk2" accent1="accent1" accent2="accent2" accent3="accent3" accent4="accent4" accent5="accent5" accent6="accent6" hlink="hlink" folHlink="folHlink"/>
-  <p:hf dt="0"/>
+  <p:hf sldNum="0" ftr="0"/>
 </p:handoutMaster>
 </file>
 
@@ -437,7 +443,7 @@
         </p:nvSpPr>
         <p:spPr>
           <a:xfrm>
-            <a:off x="3884613" y="0"/>
+            <a:off x="3884613" y="96250"/>
             <a:ext cx="2971800" cy="457200"/>
           </a:xfrm>
           <a:prstGeom prst="rect">
@@ -465,13 +471,10 @@
             <a:pPr>
               <a:defRPr/>
             </a:pPr>
-            <a:fld id="{72FDBE47-C34F-CF4A-9709-1411AD5B3286}" type="datetime1">
-              <a:rPr lang="en-CA"/>
-              <a:pPr>
-                <a:defRPr/>
-              </a:pPr>
-              <a:t>10/25/16</a:t>
-            </a:fld>
+            <a:r>
+              <a:rPr lang="en-US" smtClean="0"/>
+              <a:t>Chef Software, Inc.</a:t>
+            </a:r>
             <a:endParaRPr lang="en-US" dirty="0"/>
           </a:p>
         </p:txBody>
@@ -522,8 +525,8 @@
         </p:nvSpPr>
         <p:spPr>
           <a:xfrm>
-            <a:off x="685800" y="4343400"/>
-            <a:ext cx="5486400" cy="4114800"/>
+            <a:off x="394636" y="4343399"/>
+            <a:ext cx="6083166" cy="4367463"/>
           </a:xfrm>
           <a:prstGeom prst="rect">
             <a:avLst/>
@@ -574,57 +577,6 @@
       </p:sp>
       <p:sp>
         <p:nvSpPr>
-          <p:cNvPr id="7" name="Slide Number Placeholder 6"/>
-          <p:cNvSpPr>
-            <a:spLocks noGrp="1"/>
-          </p:cNvSpPr>
-          <p:nvPr>
-            <p:ph type="sldNum" sz="quarter" idx="5"/>
-          </p:nvPr>
-        </p:nvSpPr>
-        <p:spPr>
-          <a:xfrm>
-            <a:off x="6172200" y="8685213"/>
-            <a:ext cx="684213" cy="457200"/>
-          </a:xfrm>
-          <a:prstGeom prst="rect">
-            <a:avLst/>
-          </a:prstGeom>
-        </p:spPr>
-        <p:txBody>
-          <a:bodyPr vert="horz" lIns="91440" tIns="45720" rIns="91440" bIns="45720" rtlCol="0" anchor="b"/>
-          <a:lstStyle>
-            <a:lvl1pPr algn="r" defTabSz="1219120" fontAlgn="auto">
-              <a:spcBef>
-                <a:spcPts val="0"/>
-              </a:spcBef>
-              <a:spcAft>
-                <a:spcPts val="0"/>
-              </a:spcAft>
-              <a:defRPr sz="1200" smtClean="0">
-                <a:latin typeface="Arial" panose="020B0604020202020204" pitchFamily="34" charset="0"/>
-                <a:ea typeface="+mn-ea"/>
-                <a:cs typeface="Arial" panose="020B0604020202020204" pitchFamily="34" charset="0"/>
-              </a:defRPr>
-            </a:lvl1pPr>
-          </a:lstStyle>
-          <a:p>
-            <a:pPr>
-              <a:defRPr/>
-            </a:pPr>
-            <a:fld id="{DC3734AA-3150-D947-AC52-2F5DF48BFCD5}" type="slidenum">
-              <a:rPr lang="en-US"/>
-              <a:pPr>
-                <a:defRPr/>
-              </a:pPr>
-              <a:t>‹#›</a:t>
-            </a:fld>
-            <a:endParaRPr lang="en-US" dirty="0"/>
-          </a:p>
-        </p:txBody>
-      </p:sp>
-      <p:sp>
-        <p:nvSpPr>
           <p:cNvPr id="8" name="Header Placeholder 1"/>
           <p:cNvSpPr>
             <a:spLocks noGrp="1"/>
@@ -635,7 +587,7 @@
         </p:nvSpPr>
         <p:spPr>
           <a:xfrm>
-            <a:off x="0" y="0"/>
+            <a:off x="0" y="96250"/>
             <a:ext cx="2971800" cy="457200"/>
           </a:xfrm>
           <a:prstGeom prst="rect">
@@ -663,53 +615,10 @@
             <a:pPr>
               <a:defRPr/>
             </a:pPr>
-            <a:endParaRPr lang="en-US"/>
-          </a:p>
-        </p:txBody>
-      </p:sp>
-      <p:sp>
-        <p:nvSpPr>
-          <p:cNvPr id="9" name="Footer Placeholder 3"/>
-          <p:cNvSpPr>
-            <a:spLocks noGrp="1"/>
-          </p:cNvSpPr>
-          <p:nvPr>
-            <p:ph type="ftr" sz="quarter" idx="4"/>
-          </p:nvPr>
-        </p:nvSpPr>
-        <p:spPr>
-          <a:xfrm>
-            <a:off x="0" y="8685213"/>
-            <a:ext cx="6248400" cy="457200"/>
-          </a:xfrm>
-          <a:prstGeom prst="rect">
-            <a:avLst/>
-          </a:prstGeom>
-        </p:spPr>
-        <p:txBody>
-          <a:bodyPr vert="horz" lIns="91440" tIns="45720" rIns="91440" bIns="45720" rtlCol="0" anchor="b"/>
-          <a:lstStyle>
-            <a:lvl1pPr algn="l" defTabSz="1219120" fontAlgn="auto">
-              <a:spcBef>
-                <a:spcPts val="0"/>
-              </a:spcBef>
-              <a:spcAft>
-                <a:spcPts val="0"/>
-              </a:spcAft>
-              <a:defRPr sz="900" dirty="0" smtClean="0">
-                <a:solidFill>
-                  <a:srgbClr val="000000"/>
-                </a:solidFill>
-                <a:latin typeface="Arial" panose="020B0604020202020204" pitchFamily="34" charset="0"/>
-                <a:ea typeface="+mn-ea"/>
-                <a:cs typeface="Arial" panose="020B0604020202020204" pitchFamily="34" charset="0"/>
-              </a:defRPr>
-            </a:lvl1pPr>
-          </a:lstStyle>
-          <a:p>
-            <a:pPr>
-              <a:defRPr/>
-            </a:pPr>
+            <a:r>
+              <a:rPr lang="en-US" smtClean="0"/>
+              <a:t>Elegant Tests</a:t>
+            </a:r>
             <a:endParaRPr lang="en-US"/>
           </a:p>
         </p:txBody>
@@ -722,7 +631,7 @@
     </p:extLst>
   </p:cSld>
   <p:clrMap bg1="lt1" tx1="dk1" bg2="lt2" tx2="dk2" accent1="accent1" accent2="accent2" accent3="accent3" accent4="accent4" accent5="accent5" accent6="accent6" hlink="hlink" folHlink="folHlink"/>
-  <p:hf dt="0"/>
+  <p:hf sldNum="0" ftr="0"/>
   <p:notesStyle>
     <a:lvl1pPr algn="l" defTabSz="1217613" rtl="0" fontAlgn="base">
       <a:lnSpc>
@@ -915,18 +824,30 @@
           <a:bodyPr/>
           <a:lstStyle/>
           <a:p>
+            <a:r>
+              <a:rPr lang="en-US" dirty="0" smtClean="0"/>
+              <a:t>The fourth technique we are going to explore is </a:t>
+            </a:r>
+            <a:r>
+              <a:rPr lang="en-US" dirty="0" err="1" smtClean="0"/>
+              <a:t>shared_context</a:t>
+            </a:r>
+            <a:r>
+              <a:rPr lang="en-US" dirty="0" smtClean="0"/>
+              <a:t>.</a:t>
+            </a:r>
             <a:endParaRPr lang="en-US" dirty="0"/>
           </a:p>
         </p:txBody>
       </p:sp>
       <p:sp>
         <p:nvSpPr>
-          <p:cNvPr id="4" name="Slide Number Placeholder 3"/>
+          <p:cNvPr id="5" name="Header Placeholder 4"/>
           <p:cNvSpPr>
             <a:spLocks noGrp="1"/>
           </p:cNvSpPr>
           <p:nvPr>
-            <p:ph type="sldNum" sz="quarter" idx="10"/>
+            <p:ph type="hdr" sz="quarter" idx="11"/>
           </p:nvPr>
         </p:nvSpPr>
         <p:spPr/>
@@ -937,25 +858,22 @@
             <a:pPr>
               <a:defRPr/>
             </a:pPr>
-            <a:fld id="{DC3734AA-3150-D947-AC52-2F5DF48BFCD5}" type="slidenum">
+            <a:r>
               <a:rPr lang="en-US" smtClean="0"/>
-              <a:pPr>
-                <a:defRPr/>
-              </a:pPr>
-              <a:t>1</a:t>
-            </a:fld>
-            <a:endParaRPr lang="en-US" dirty="0"/>
-          </a:p>
-        </p:txBody>
-      </p:sp>
-      <p:sp>
-        <p:nvSpPr>
-          <p:cNvPr id="5" name="Header Placeholder 4"/>
+              <a:t>Elegant Tests</a:t>
+            </a:r>
+            <a:endParaRPr lang="en-US"/>
+          </a:p>
+        </p:txBody>
+      </p:sp>
+      <p:sp>
+        <p:nvSpPr>
+          <p:cNvPr id="7" name="Date Placeholder 6"/>
           <p:cNvSpPr>
             <a:spLocks noGrp="1"/>
           </p:cNvSpPr>
           <p:nvPr>
-            <p:ph type="hdr" sz="quarter" idx="11"/>
+            <p:ph type="dt" idx="13"/>
           </p:nvPr>
         </p:nvSpPr>
         <p:spPr/>
@@ -966,29 +884,11 @@
             <a:pPr>
               <a:defRPr/>
             </a:pPr>
-            <a:endParaRPr lang="en-US"/>
-          </a:p>
-        </p:txBody>
-      </p:sp>
-      <p:sp>
-        <p:nvSpPr>
-          <p:cNvPr id="6" name="Footer Placeholder 5"/>
-          <p:cNvSpPr>
-            <a:spLocks noGrp="1"/>
-          </p:cNvSpPr>
-          <p:nvPr>
-            <p:ph type="ftr" sz="quarter" idx="12"/>
-          </p:nvPr>
-        </p:nvSpPr>
-        <p:spPr/>
-        <p:txBody>
-          <a:bodyPr/>
-          <a:lstStyle/>
-          <a:p>
-            <a:pPr>
-              <a:defRPr/>
-            </a:pPr>
-            <a:endParaRPr lang="en-US"/>
+            <a:r>
+              <a:rPr lang="en-US" smtClean="0"/>
+              <a:t>Chef Software, Inc.</a:t>
+            </a:r>
+            <a:endParaRPr lang="en-US" dirty="0"/>
           </a:p>
         </p:txBody>
       </p:sp>
@@ -996,6 +896,595 @@
     <p:extLst>
       <p:ext uri="{BB962C8B-B14F-4D97-AF65-F5344CB8AC3E}">
         <p14:creationId xmlns:p14="http://schemas.microsoft.com/office/powerpoint/2010/main" val="858490020"/>
+      </p:ext>
+    </p:extLst>
+  </p:cSld>
+  <p:clrMapOvr>
+    <a:masterClrMapping/>
+  </p:clrMapOvr>
+</p:notes>
+</file>
+
+<file path=ppt/notesSlides/notesSlide10.xml><?xml version="1.0" encoding="utf-8"?>
+<p:notes xmlns:a="http://schemas.openxmlformats.org/drawingml/2006/main" xmlns:r="http://schemas.openxmlformats.org/officeDocument/2006/relationships" xmlns:p="http://schemas.openxmlformats.org/presentationml/2006/main">
+  <p:cSld>
+    <p:spTree>
+      <p:nvGrpSpPr>
+        <p:cNvPr id="1" name=""/>
+        <p:cNvGrpSpPr/>
+        <p:nvPr/>
+      </p:nvGrpSpPr>
+      <p:grpSpPr>
+        <a:xfrm>
+          <a:off x="0" y="0"/>
+          <a:ext cx="0" cy="0"/>
+          <a:chOff x="0" y="0"/>
+          <a:chExt cx="0" cy="0"/>
+        </a:xfrm>
+      </p:grpSpPr>
+      <p:sp>
+        <p:nvSpPr>
+          <p:cNvPr id="2" name="Slide Image Placeholder 1"/>
+          <p:cNvSpPr>
+            <a:spLocks noGrp="1" noRot="1" noChangeAspect="1"/>
+          </p:cNvSpPr>
+          <p:nvPr>
+            <p:ph type="sldImg"/>
+          </p:nvPr>
+        </p:nvSpPr>
+        <p:spPr/>
+      </p:sp>
+      <p:sp>
+        <p:nvSpPr>
+          <p:cNvPr id="3" name="Notes Placeholder 2"/>
+          <p:cNvSpPr>
+            <a:spLocks noGrp="1"/>
+          </p:cNvSpPr>
+          <p:nvPr>
+            <p:ph type="body" idx="1"/>
+          </p:nvPr>
+        </p:nvSpPr>
+        <p:spPr/>
+        <p:txBody>
+          <a:bodyPr/>
+          <a:lstStyle/>
+          <a:p>
+            <a:r>
+              <a:rPr lang="en-US" dirty="0" smtClean="0"/>
+              <a:t>We create the </a:t>
+            </a:r>
+            <a:r>
+              <a:rPr lang="en-US" dirty="0" err="1" smtClean="0"/>
+              <a:t>shared_context</a:t>
+            </a:r>
+            <a:r>
+              <a:rPr lang="en-US" dirty="0" smtClean="0"/>
+              <a:t>, give it a name, and then move any let helpers, methods we've defined and even </a:t>
+            </a:r>
+            <a:r>
+              <a:rPr lang="en-US" dirty="0" err="1" smtClean="0"/>
+              <a:t>shared_examples</a:t>
+            </a:r>
+            <a:r>
+              <a:rPr lang="en-US" dirty="0" smtClean="0"/>
+              <a:t> that we've defined and included.</a:t>
+            </a:r>
+            <a:endParaRPr lang="en-US" dirty="0"/>
+          </a:p>
+        </p:txBody>
+      </p:sp>
+      <p:sp>
+        <p:nvSpPr>
+          <p:cNvPr id="4" name="Date Placeholder 3"/>
+          <p:cNvSpPr>
+            <a:spLocks noGrp="1"/>
+          </p:cNvSpPr>
+          <p:nvPr>
+            <p:ph type="dt" idx="10"/>
+          </p:nvPr>
+        </p:nvSpPr>
+        <p:spPr/>
+        <p:txBody>
+          <a:bodyPr/>
+          <a:lstStyle/>
+          <a:p>
+            <a:pPr>
+              <a:defRPr/>
+            </a:pPr>
+            <a:r>
+              <a:rPr lang="en-US" smtClean="0"/>
+              <a:t>Chef Software, Inc.</a:t>
+            </a:r>
+            <a:endParaRPr lang="en-US" dirty="0"/>
+          </a:p>
+        </p:txBody>
+      </p:sp>
+      <p:sp>
+        <p:nvSpPr>
+          <p:cNvPr id="5" name="Header Placeholder 4"/>
+          <p:cNvSpPr>
+            <a:spLocks noGrp="1"/>
+          </p:cNvSpPr>
+          <p:nvPr>
+            <p:ph type="hdr" sz="quarter" idx="11"/>
+          </p:nvPr>
+        </p:nvSpPr>
+        <p:spPr/>
+        <p:txBody>
+          <a:bodyPr/>
+          <a:lstStyle/>
+          <a:p>
+            <a:pPr>
+              <a:defRPr/>
+            </a:pPr>
+            <a:r>
+              <a:rPr lang="en-US" smtClean="0"/>
+              <a:t>Elegant Tests</a:t>
+            </a:r>
+            <a:endParaRPr lang="en-US"/>
+          </a:p>
+        </p:txBody>
+      </p:sp>
+    </p:spTree>
+    <p:extLst>
+      <p:ext uri="{BB962C8B-B14F-4D97-AF65-F5344CB8AC3E}">
+        <p14:creationId xmlns:p14="http://schemas.microsoft.com/office/powerpoint/2010/main" val="1685957132"/>
+      </p:ext>
+    </p:extLst>
+  </p:cSld>
+  <p:clrMapOvr>
+    <a:masterClrMapping/>
+  </p:clrMapOvr>
+</p:notes>
+</file>
+
+<file path=ppt/notesSlides/notesSlide11.xml><?xml version="1.0" encoding="utf-8"?>
+<p:notes xmlns:a="http://schemas.openxmlformats.org/drawingml/2006/main" xmlns:r="http://schemas.openxmlformats.org/officeDocument/2006/relationships" xmlns:p="http://schemas.openxmlformats.org/presentationml/2006/main">
+  <p:cSld>
+    <p:spTree>
+      <p:nvGrpSpPr>
+        <p:cNvPr id="1" name=""/>
+        <p:cNvGrpSpPr/>
+        <p:nvPr/>
+      </p:nvGrpSpPr>
+      <p:grpSpPr>
+        <a:xfrm>
+          <a:off x="0" y="0"/>
+          <a:ext cx="0" cy="0"/>
+          <a:chOff x="0" y="0"/>
+          <a:chExt cx="0" cy="0"/>
+        </a:xfrm>
+      </p:grpSpPr>
+      <p:sp>
+        <p:nvSpPr>
+          <p:cNvPr id="2" name="Slide Image Placeholder 1"/>
+          <p:cNvSpPr>
+            <a:spLocks noGrp="1" noRot="1" noChangeAspect="1"/>
+          </p:cNvSpPr>
+          <p:nvPr>
+            <p:ph type="sldImg"/>
+          </p:nvPr>
+        </p:nvSpPr>
+        <p:spPr/>
+      </p:sp>
+      <p:sp>
+        <p:nvSpPr>
+          <p:cNvPr id="3" name="Notes Placeholder 2"/>
+          <p:cNvSpPr>
+            <a:spLocks noGrp="1"/>
+          </p:cNvSpPr>
+          <p:nvPr>
+            <p:ph type="body" idx="1"/>
+          </p:nvPr>
+        </p:nvSpPr>
+        <p:spPr/>
+        <p:txBody>
+          <a:bodyPr/>
+          <a:lstStyle/>
+          <a:p>
+            <a:endParaRPr lang="en-US" dirty="0"/>
+          </a:p>
+        </p:txBody>
+      </p:sp>
+      <p:sp>
+        <p:nvSpPr>
+          <p:cNvPr id="5" name="Header Placeholder 4"/>
+          <p:cNvSpPr>
+            <a:spLocks noGrp="1"/>
+          </p:cNvSpPr>
+          <p:nvPr>
+            <p:ph type="hdr" sz="quarter" idx="11"/>
+          </p:nvPr>
+        </p:nvSpPr>
+        <p:spPr/>
+        <p:txBody>
+          <a:bodyPr/>
+          <a:lstStyle/>
+          <a:p>
+            <a:pPr>
+              <a:defRPr/>
+            </a:pPr>
+            <a:r>
+              <a:rPr lang="en-US" smtClean="0"/>
+              <a:t>Elegant Tests</a:t>
+            </a:r>
+            <a:endParaRPr lang="en-US"/>
+          </a:p>
+        </p:txBody>
+      </p:sp>
+      <p:sp>
+        <p:nvSpPr>
+          <p:cNvPr id="7" name="Date Placeholder 6"/>
+          <p:cNvSpPr>
+            <a:spLocks noGrp="1"/>
+          </p:cNvSpPr>
+          <p:nvPr>
+            <p:ph type="dt" idx="13"/>
+          </p:nvPr>
+        </p:nvSpPr>
+        <p:spPr/>
+        <p:txBody>
+          <a:bodyPr/>
+          <a:lstStyle/>
+          <a:p>
+            <a:pPr>
+              <a:defRPr/>
+            </a:pPr>
+            <a:r>
+              <a:rPr lang="en-US" smtClean="0"/>
+              <a:t>Chef Software, Inc.</a:t>
+            </a:r>
+            <a:endParaRPr lang="en-US" dirty="0"/>
+          </a:p>
+        </p:txBody>
+      </p:sp>
+    </p:spTree>
+    <p:extLst>
+      <p:ext uri="{BB962C8B-B14F-4D97-AF65-F5344CB8AC3E}">
+        <p14:creationId xmlns:p14="http://schemas.microsoft.com/office/powerpoint/2010/main" val="103301370"/>
+      </p:ext>
+    </p:extLst>
+  </p:cSld>
+  <p:clrMapOvr>
+    <a:masterClrMapping/>
+  </p:clrMapOvr>
+</p:notes>
+</file>
+
+<file path=ppt/notesSlides/notesSlide12.xml><?xml version="1.0" encoding="utf-8"?>
+<p:notes xmlns:a="http://schemas.openxmlformats.org/drawingml/2006/main" xmlns:r="http://schemas.openxmlformats.org/officeDocument/2006/relationships" xmlns:p="http://schemas.openxmlformats.org/presentationml/2006/main">
+  <p:cSld>
+    <p:spTree>
+      <p:nvGrpSpPr>
+        <p:cNvPr id="1" name=""/>
+        <p:cNvGrpSpPr/>
+        <p:nvPr/>
+      </p:nvGrpSpPr>
+      <p:grpSpPr>
+        <a:xfrm>
+          <a:off x="0" y="0"/>
+          <a:ext cx="0" cy="0"/>
+          <a:chOff x="0" y="0"/>
+          <a:chExt cx="0" cy="0"/>
+        </a:xfrm>
+      </p:grpSpPr>
+      <p:sp>
+        <p:nvSpPr>
+          <p:cNvPr id="2" name="Slide Image Placeholder 1"/>
+          <p:cNvSpPr>
+            <a:spLocks noGrp="1" noRot="1" noChangeAspect="1"/>
+          </p:cNvSpPr>
+          <p:nvPr>
+            <p:ph type="sldImg"/>
+          </p:nvPr>
+        </p:nvSpPr>
+        <p:spPr/>
+      </p:sp>
+      <p:sp>
+        <p:nvSpPr>
+          <p:cNvPr id="3" name="Notes Placeholder 2"/>
+          <p:cNvSpPr>
+            <a:spLocks noGrp="1"/>
+          </p:cNvSpPr>
+          <p:nvPr>
+            <p:ph type="body" idx="1"/>
+          </p:nvPr>
+        </p:nvSpPr>
+        <p:spPr/>
+        <p:txBody>
+          <a:bodyPr/>
+          <a:lstStyle/>
+          <a:p>
+            <a:r>
+              <a:rPr lang="en-US" dirty="0" smtClean="0"/>
+              <a:t>Now it is your turn. Refactor the code with this technique. Execute the tests. Find success.</a:t>
+            </a:r>
+            <a:endParaRPr lang="en-US" dirty="0"/>
+          </a:p>
+        </p:txBody>
+      </p:sp>
+      <p:sp>
+        <p:nvSpPr>
+          <p:cNvPr id="5" name="Header Placeholder 4"/>
+          <p:cNvSpPr>
+            <a:spLocks noGrp="1"/>
+          </p:cNvSpPr>
+          <p:nvPr>
+            <p:ph type="hdr" sz="quarter" idx="11"/>
+          </p:nvPr>
+        </p:nvSpPr>
+        <p:spPr/>
+        <p:txBody>
+          <a:bodyPr/>
+          <a:lstStyle/>
+          <a:p>
+            <a:pPr>
+              <a:defRPr/>
+            </a:pPr>
+            <a:r>
+              <a:rPr lang="en-US" smtClean="0"/>
+              <a:t>Elegant Tests</a:t>
+            </a:r>
+            <a:endParaRPr lang="en-US"/>
+          </a:p>
+        </p:txBody>
+      </p:sp>
+      <p:sp>
+        <p:nvSpPr>
+          <p:cNvPr id="7" name="Date Placeholder 6"/>
+          <p:cNvSpPr>
+            <a:spLocks noGrp="1"/>
+          </p:cNvSpPr>
+          <p:nvPr>
+            <p:ph type="dt" idx="13"/>
+          </p:nvPr>
+        </p:nvSpPr>
+        <p:spPr/>
+        <p:txBody>
+          <a:bodyPr/>
+          <a:lstStyle/>
+          <a:p>
+            <a:pPr>
+              <a:defRPr/>
+            </a:pPr>
+            <a:r>
+              <a:rPr lang="en-US" smtClean="0"/>
+              <a:t>Chef Software, Inc.</a:t>
+            </a:r>
+            <a:endParaRPr lang="en-US" dirty="0"/>
+          </a:p>
+        </p:txBody>
+      </p:sp>
+    </p:spTree>
+    <p:extLst>
+      <p:ext uri="{BB962C8B-B14F-4D97-AF65-F5344CB8AC3E}">
+        <p14:creationId xmlns:p14="http://schemas.microsoft.com/office/powerpoint/2010/main" val="2012494481"/>
+      </p:ext>
+    </p:extLst>
+  </p:cSld>
+  <p:clrMapOvr>
+    <a:masterClrMapping/>
+  </p:clrMapOvr>
+</p:notes>
+</file>
+
+<file path=ppt/notesSlides/notesSlide13.xml><?xml version="1.0" encoding="utf-8"?>
+<p:notes xmlns:a="http://schemas.openxmlformats.org/drawingml/2006/main" xmlns:r="http://schemas.openxmlformats.org/officeDocument/2006/relationships" xmlns:p="http://schemas.openxmlformats.org/presentationml/2006/main">
+  <p:cSld>
+    <p:spTree>
+      <p:nvGrpSpPr>
+        <p:cNvPr id="1" name=""/>
+        <p:cNvGrpSpPr/>
+        <p:nvPr/>
+      </p:nvGrpSpPr>
+      <p:grpSpPr>
+        <a:xfrm>
+          <a:off x="0" y="0"/>
+          <a:ext cx="0" cy="0"/>
+          <a:chOff x="0" y="0"/>
+          <a:chExt cx="0" cy="0"/>
+        </a:xfrm>
+      </p:grpSpPr>
+      <p:sp>
+        <p:nvSpPr>
+          <p:cNvPr id="2" name="Slide Image Placeholder 1"/>
+          <p:cNvSpPr>
+            <a:spLocks noGrp="1" noRot="1" noChangeAspect="1"/>
+          </p:cNvSpPr>
+          <p:nvPr>
+            <p:ph type="sldImg"/>
+          </p:nvPr>
+        </p:nvSpPr>
+        <p:spPr/>
+      </p:sp>
+      <p:sp>
+        <p:nvSpPr>
+          <p:cNvPr id="3" name="Notes Placeholder 2"/>
+          <p:cNvSpPr>
+            <a:spLocks noGrp="1"/>
+          </p:cNvSpPr>
+          <p:nvPr>
+            <p:ph type="body" idx="1"/>
+          </p:nvPr>
+        </p:nvSpPr>
+        <p:spPr/>
+        <p:txBody>
+          <a:bodyPr/>
+          <a:lstStyle/>
+          <a:p>
+            <a:endParaRPr lang="en-US" dirty="0"/>
+          </a:p>
+        </p:txBody>
+      </p:sp>
+      <p:sp>
+        <p:nvSpPr>
+          <p:cNvPr id="5" name="Header Placeholder 4"/>
+          <p:cNvSpPr>
+            <a:spLocks noGrp="1"/>
+          </p:cNvSpPr>
+          <p:nvPr>
+            <p:ph type="hdr" sz="quarter" idx="11"/>
+          </p:nvPr>
+        </p:nvSpPr>
+        <p:spPr/>
+        <p:txBody>
+          <a:bodyPr/>
+          <a:lstStyle/>
+          <a:p>
+            <a:pPr>
+              <a:defRPr/>
+            </a:pPr>
+            <a:r>
+              <a:rPr lang="en-US" smtClean="0"/>
+              <a:t>Elegant Tests</a:t>
+            </a:r>
+            <a:endParaRPr lang="en-US"/>
+          </a:p>
+        </p:txBody>
+      </p:sp>
+      <p:sp>
+        <p:nvSpPr>
+          <p:cNvPr id="7" name="Date Placeholder 6"/>
+          <p:cNvSpPr>
+            <a:spLocks noGrp="1"/>
+          </p:cNvSpPr>
+          <p:nvPr>
+            <p:ph type="dt" idx="13"/>
+          </p:nvPr>
+        </p:nvSpPr>
+        <p:spPr/>
+        <p:txBody>
+          <a:bodyPr/>
+          <a:lstStyle/>
+          <a:p>
+            <a:pPr>
+              <a:defRPr/>
+            </a:pPr>
+            <a:r>
+              <a:rPr lang="en-US" smtClean="0"/>
+              <a:t>Chef Software, Inc.</a:t>
+            </a:r>
+            <a:endParaRPr lang="en-US" dirty="0"/>
+          </a:p>
+        </p:txBody>
+      </p:sp>
+    </p:spTree>
+    <p:extLst>
+      <p:ext uri="{BB962C8B-B14F-4D97-AF65-F5344CB8AC3E}">
+        <p14:creationId xmlns:p14="http://schemas.microsoft.com/office/powerpoint/2010/main" val="103301370"/>
+      </p:ext>
+    </p:extLst>
+  </p:cSld>
+  <p:clrMapOvr>
+    <a:masterClrMapping/>
+  </p:clrMapOvr>
+</p:notes>
+</file>
+
+<file path=ppt/notesSlides/notesSlide14.xml><?xml version="1.0" encoding="utf-8"?>
+<p:notes xmlns:a="http://schemas.openxmlformats.org/drawingml/2006/main" xmlns:r="http://schemas.openxmlformats.org/officeDocument/2006/relationships" xmlns:p="http://schemas.openxmlformats.org/presentationml/2006/main">
+  <p:cSld>
+    <p:spTree>
+      <p:nvGrpSpPr>
+        <p:cNvPr id="1" name=""/>
+        <p:cNvGrpSpPr/>
+        <p:nvPr/>
+      </p:nvGrpSpPr>
+      <p:grpSpPr>
+        <a:xfrm>
+          <a:off x="0" y="0"/>
+          <a:ext cx="0" cy="0"/>
+          <a:chOff x="0" y="0"/>
+          <a:chExt cx="0" cy="0"/>
+        </a:xfrm>
+      </p:grpSpPr>
+      <p:sp>
+        <p:nvSpPr>
+          <p:cNvPr id="2" name="Slide Image Placeholder 1"/>
+          <p:cNvSpPr>
+            <a:spLocks noGrp="1" noRot="1" noChangeAspect="1"/>
+          </p:cNvSpPr>
+          <p:nvPr>
+            <p:ph type="sldImg"/>
+          </p:nvPr>
+        </p:nvSpPr>
+        <p:spPr/>
+      </p:sp>
+      <p:sp>
+        <p:nvSpPr>
+          <p:cNvPr id="3" name="Notes Placeholder 2"/>
+          <p:cNvSpPr>
+            <a:spLocks noGrp="1"/>
+          </p:cNvSpPr>
+          <p:nvPr>
+            <p:ph type="body" idx="1"/>
+          </p:nvPr>
+        </p:nvSpPr>
+        <p:spPr/>
+        <p:txBody>
+          <a:bodyPr/>
+          <a:lstStyle/>
+          <a:p>
+            <a:endParaRPr lang="en-US"/>
+          </a:p>
+        </p:txBody>
+      </p:sp>
+      <p:sp>
+        <p:nvSpPr>
+          <p:cNvPr id="5" name="Header Placeholder 4"/>
+          <p:cNvSpPr>
+            <a:spLocks noGrp="1"/>
+          </p:cNvSpPr>
+          <p:nvPr>
+            <p:ph type="hdr" sz="quarter" idx="11"/>
+          </p:nvPr>
+        </p:nvSpPr>
+        <p:spPr/>
+        <p:txBody>
+          <a:bodyPr/>
+          <a:lstStyle/>
+          <a:p>
+            <a:pPr>
+              <a:defRPr/>
+            </a:pPr>
+            <a:r>
+              <a:rPr lang="en-US" smtClean="0"/>
+              <a:t>Elegant Tests</a:t>
+            </a:r>
+            <a:endParaRPr lang="en-US"/>
+          </a:p>
+        </p:txBody>
+      </p:sp>
+      <p:sp>
+        <p:nvSpPr>
+          <p:cNvPr id="7" name="Date Placeholder 6"/>
+          <p:cNvSpPr>
+            <a:spLocks noGrp="1"/>
+          </p:cNvSpPr>
+          <p:nvPr>
+            <p:ph type="dt" idx="13"/>
+          </p:nvPr>
+        </p:nvSpPr>
+        <p:spPr/>
+        <p:txBody>
+          <a:bodyPr/>
+          <a:lstStyle/>
+          <a:p>
+            <a:pPr>
+              <a:defRPr/>
+            </a:pPr>
+            <a:r>
+              <a:rPr lang="en-US" smtClean="0"/>
+              <a:t>Chef Software, Inc.</a:t>
+            </a:r>
+            <a:endParaRPr lang="en-US" dirty="0"/>
+          </a:p>
+        </p:txBody>
+      </p:sp>
+    </p:spTree>
+    <p:extLst>
+      <p:ext uri="{BB962C8B-B14F-4D97-AF65-F5344CB8AC3E}">
+        <p14:creationId xmlns:p14="http://schemas.microsoft.com/office/powerpoint/2010/main" val="1131635002"/>
       </p:ext>
     </p:extLst>
   </p:cSld>
@@ -1049,18 +1538,30 @@
           <a:bodyPr/>
           <a:lstStyle/>
           <a:p>
+            <a:r>
+              <a:rPr lang="en-US" dirty="0" smtClean="0"/>
+              <a:t>In this module we will use </a:t>
+            </a:r>
+            <a:r>
+              <a:rPr lang="en-US" dirty="0" err="1" smtClean="0"/>
+              <a:t>shared_context</a:t>
+            </a:r>
+            <a:r>
+              <a:rPr lang="en-US" dirty="0" smtClean="0"/>
+              <a:t> to capture all our helpers in a single place; saving all we wrote to use another day.</a:t>
+            </a:r>
             <a:endParaRPr lang="en-US" dirty="0"/>
           </a:p>
         </p:txBody>
       </p:sp>
       <p:sp>
         <p:nvSpPr>
-          <p:cNvPr id="4" name="Slide Number Placeholder 3"/>
+          <p:cNvPr id="5" name="Header Placeholder 4"/>
           <p:cNvSpPr>
             <a:spLocks noGrp="1"/>
           </p:cNvSpPr>
           <p:nvPr>
-            <p:ph type="sldNum" sz="quarter" idx="10"/>
+            <p:ph type="hdr" sz="quarter" idx="11"/>
           </p:nvPr>
         </p:nvSpPr>
         <p:spPr/>
@@ -1071,25 +1572,22 @@
             <a:pPr>
               <a:defRPr/>
             </a:pPr>
-            <a:fld id="{DC3734AA-3150-D947-AC52-2F5DF48BFCD5}" type="slidenum">
+            <a:r>
               <a:rPr lang="en-US" smtClean="0"/>
-              <a:pPr>
-                <a:defRPr/>
-              </a:pPr>
-              <a:t>2</a:t>
-            </a:fld>
-            <a:endParaRPr lang="en-US" dirty="0"/>
-          </a:p>
-        </p:txBody>
-      </p:sp>
-      <p:sp>
-        <p:nvSpPr>
-          <p:cNvPr id="5" name="Header Placeholder 4"/>
+              <a:t>Elegant Tests</a:t>
+            </a:r>
+            <a:endParaRPr lang="en-US"/>
+          </a:p>
+        </p:txBody>
+      </p:sp>
+      <p:sp>
+        <p:nvSpPr>
+          <p:cNvPr id="7" name="Date Placeholder 6"/>
           <p:cNvSpPr>
             <a:spLocks noGrp="1"/>
           </p:cNvSpPr>
           <p:nvPr>
-            <p:ph type="hdr" sz="quarter" idx="11"/>
+            <p:ph type="dt" idx="13"/>
           </p:nvPr>
         </p:nvSpPr>
         <p:spPr/>
@@ -1100,29 +1598,11 @@
             <a:pPr>
               <a:defRPr/>
             </a:pPr>
-            <a:endParaRPr lang="en-US"/>
-          </a:p>
-        </p:txBody>
-      </p:sp>
-      <p:sp>
-        <p:nvSpPr>
-          <p:cNvPr id="6" name="Footer Placeholder 5"/>
-          <p:cNvSpPr>
-            <a:spLocks noGrp="1"/>
-          </p:cNvSpPr>
-          <p:nvPr>
-            <p:ph type="ftr" sz="quarter" idx="12"/>
-          </p:nvPr>
-        </p:nvSpPr>
-        <p:spPr/>
-        <p:txBody>
-          <a:bodyPr/>
-          <a:lstStyle/>
-          <a:p>
-            <a:pPr>
-              <a:defRPr/>
-            </a:pPr>
-            <a:endParaRPr lang="en-US"/>
+            <a:r>
+              <a:rPr lang="en-US" smtClean="0"/>
+              <a:t>Chef Software, Inc.</a:t>
+            </a:r>
+            <a:endParaRPr lang="en-US" dirty="0"/>
           </a:p>
         </p:txBody>
       </p:sp>
@@ -1183,18 +1663,26 @@
           <a:bodyPr/>
           <a:lstStyle/>
           <a:p>
+            <a:r>
+              <a:rPr lang="en-US" dirty="0"/>
+              <a:t>First we will explore the concepts around this technique, I will demonstrate the use of this technique, we will review what was demonstrated, and then I will ask you to participate in a related exercise</a:t>
+            </a:r>
+            <a:r>
+              <a:rPr lang="en-US" dirty="0" smtClean="0"/>
+              <a:t>.</a:t>
+            </a:r>
             <a:endParaRPr lang="en-US" dirty="0"/>
           </a:p>
         </p:txBody>
       </p:sp>
       <p:sp>
         <p:nvSpPr>
-          <p:cNvPr id="4" name="Slide Number Placeholder 3"/>
+          <p:cNvPr id="5" name="Header Placeholder 4"/>
           <p:cNvSpPr>
             <a:spLocks noGrp="1"/>
           </p:cNvSpPr>
           <p:nvPr>
-            <p:ph type="sldNum" sz="quarter" idx="10"/>
+            <p:ph type="hdr" sz="quarter" idx="11"/>
           </p:nvPr>
         </p:nvSpPr>
         <p:spPr/>
@@ -1205,25 +1693,22 @@
             <a:pPr>
               <a:defRPr/>
             </a:pPr>
-            <a:fld id="{DC3734AA-3150-D947-AC52-2F5DF48BFCD5}" type="slidenum">
+            <a:r>
               <a:rPr lang="en-US" smtClean="0"/>
-              <a:pPr>
-                <a:defRPr/>
-              </a:pPr>
-              <a:t>3</a:t>
-            </a:fld>
-            <a:endParaRPr lang="en-US" dirty="0"/>
-          </a:p>
-        </p:txBody>
-      </p:sp>
-      <p:sp>
-        <p:nvSpPr>
-          <p:cNvPr id="5" name="Header Placeholder 4"/>
+              <a:t>Elegant Tests</a:t>
+            </a:r>
+            <a:endParaRPr lang="en-US"/>
+          </a:p>
+        </p:txBody>
+      </p:sp>
+      <p:sp>
+        <p:nvSpPr>
+          <p:cNvPr id="7" name="Date Placeholder 6"/>
           <p:cNvSpPr>
             <a:spLocks noGrp="1"/>
           </p:cNvSpPr>
           <p:nvPr>
-            <p:ph type="hdr" sz="quarter" idx="11"/>
+            <p:ph type="dt" idx="13"/>
           </p:nvPr>
         </p:nvSpPr>
         <p:spPr/>
@@ -1234,29 +1719,11 @@
             <a:pPr>
               <a:defRPr/>
             </a:pPr>
-            <a:endParaRPr lang="en-US"/>
-          </a:p>
-        </p:txBody>
-      </p:sp>
-      <p:sp>
-        <p:nvSpPr>
-          <p:cNvPr id="6" name="Footer Placeholder 5"/>
-          <p:cNvSpPr>
-            <a:spLocks noGrp="1"/>
-          </p:cNvSpPr>
-          <p:nvPr>
-            <p:ph type="ftr" sz="quarter" idx="12"/>
-          </p:nvPr>
-        </p:nvSpPr>
-        <p:spPr/>
-        <p:txBody>
-          <a:bodyPr/>
-          <a:lstStyle/>
-          <a:p>
-            <a:pPr>
-              <a:defRPr/>
-            </a:pPr>
-            <a:endParaRPr lang="en-US"/>
+            <a:r>
+              <a:rPr lang="en-US" smtClean="0"/>
+              <a:t>Chef Software, Inc.</a:t>
+            </a:r>
+            <a:endParaRPr lang="en-US" dirty="0"/>
           </a:p>
         </p:txBody>
       </p:sp>
@@ -1317,18 +1784,30 @@
           <a:bodyPr/>
           <a:lstStyle/>
           <a:p>
+            <a:r>
+              <a:rPr lang="en-US" dirty="0" smtClean="0"/>
+              <a:t>We have defined helpers with common helpers with let, examples that we have shared, and methods to assist us to retrieve node attributes. All of these these exist as separate helpers. A </a:t>
+            </a:r>
+            <a:r>
+              <a:rPr lang="en-US" dirty="0" err="1" smtClean="0"/>
+              <a:t>shared_context</a:t>
+            </a:r>
+            <a:r>
+              <a:rPr lang="en-US" dirty="0" smtClean="0"/>
+              <a:t> is a way for us to collect all these useful tools in a single place, give them a name, and then include them anywhere they are needed.</a:t>
+            </a:r>
             <a:endParaRPr lang="en-US" dirty="0"/>
           </a:p>
         </p:txBody>
       </p:sp>
       <p:sp>
         <p:nvSpPr>
-          <p:cNvPr id="4" name="Slide Number Placeholder 3"/>
+          <p:cNvPr id="4" name="Date Placeholder 3"/>
           <p:cNvSpPr>
             <a:spLocks noGrp="1"/>
           </p:cNvSpPr>
           <p:nvPr>
-            <p:ph type="sldNum" sz="quarter" idx="10"/>
+            <p:ph type="dt" idx="10"/>
           </p:nvPr>
         </p:nvSpPr>
         <p:spPr/>
@@ -1339,13 +1818,10 @@
             <a:pPr>
               <a:defRPr/>
             </a:pPr>
-            <a:fld id="{DC3734AA-3150-D947-AC52-2F5DF48BFCD5}" type="slidenum">
+            <a:r>
               <a:rPr lang="en-US" smtClean="0"/>
-              <a:pPr>
-                <a:defRPr/>
-              </a:pPr>
-              <a:t>5</a:t>
-            </a:fld>
+              <a:t>Chef Software, Inc.</a:t>
+            </a:r>
             <a:endParaRPr lang="en-US" dirty="0"/>
           </a:p>
         </p:txBody>
@@ -1368,28 +1844,10 @@
             <a:pPr>
               <a:defRPr/>
             </a:pPr>
-            <a:endParaRPr lang="en-US"/>
-          </a:p>
-        </p:txBody>
-      </p:sp>
-      <p:sp>
-        <p:nvSpPr>
-          <p:cNvPr id="6" name="Footer Placeholder 5"/>
-          <p:cNvSpPr>
-            <a:spLocks noGrp="1"/>
-          </p:cNvSpPr>
-          <p:nvPr>
-            <p:ph type="ftr" sz="quarter" idx="12"/>
-          </p:nvPr>
-        </p:nvSpPr>
-        <p:spPr/>
-        <p:txBody>
-          <a:bodyPr/>
-          <a:lstStyle/>
-          <a:p>
-            <a:pPr>
-              <a:defRPr/>
-            </a:pPr>
+            <a:r>
+              <a:rPr lang="en-US" smtClean="0"/>
+              <a:t>Elegant Tests</a:t>
+            </a:r>
             <a:endParaRPr lang="en-US"/>
           </a:p>
         </p:txBody>
@@ -1397,7 +1855,7 @@
     </p:spTree>
     <p:extLst>
       <p:ext uri="{BB962C8B-B14F-4D97-AF65-F5344CB8AC3E}">
-        <p14:creationId xmlns:p14="http://schemas.microsoft.com/office/powerpoint/2010/main" val="103301370"/>
+        <p14:creationId xmlns:p14="http://schemas.microsoft.com/office/powerpoint/2010/main" val="19499589"/>
       </p:ext>
     </p:extLst>
   </p:cSld>
@@ -1451,18 +1909,36 @@
           <a:bodyPr/>
           <a:lstStyle/>
           <a:p>
+            <a:r>
+              <a:rPr lang="en-US" dirty="0" smtClean="0"/>
+              <a:t>When we examine all of the helpers that we have created so far to help us make our specifications clearer we see that they are are all attempting to describe when a recipe converges on a system.</a:t>
+            </a:r>
+          </a:p>
+          <a:p>
+            <a:r>
+              <a:rPr lang="en-US" dirty="0" smtClean="0"/>
+              <a:t>A converged system will always have a </a:t>
+            </a:r>
+            <a:r>
+              <a:rPr lang="en-US" dirty="0" err="1" smtClean="0"/>
+              <a:t>chef_run</a:t>
+            </a:r>
+            <a:r>
+              <a:rPr lang="en-US" dirty="0" smtClean="0"/>
+              <a:t> and a node object. You will also likely want to access node attributes. You could make an argument that installing packages does not take place in every recipe and not make it part of this shared context 'converging recipes'. With this cookbook the default recipe and all platforms definitely install some packages but that is not the case for every cookbook. As always correctly naming these things that you create is difficult to do correctly.</a:t>
+            </a:r>
             <a:endParaRPr lang="en-US" dirty="0"/>
           </a:p>
         </p:txBody>
       </p:sp>
       <p:sp>
         <p:nvSpPr>
-          <p:cNvPr id="4" name="Slide Number Placeholder 3"/>
+          <p:cNvPr id="4" name="Date Placeholder 3"/>
           <p:cNvSpPr>
             <a:spLocks noGrp="1"/>
           </p:cNvSpPr>
           <p:nvPr>
-            <p:ph type="sldNum" sz="quarter" idx="10"/>
+            <p:ph type="dt" idx="10"/>
           </p:nvPr>
         </p:nvSpPr>
         <p:spPr/>
@@ -1473,13 +1949,10 @@
             <a:pPr>
               <a:defRPr/>
             </a:pPr>
-            <a:fld id="{DC3734AA-3150-D947-AC52-2F5DF48BFCD5}" type="slidenum">
+            <a:r>
               <a:rPr lang="en-US" smtClean="0"/>
-              <a:pPr>
-                <a:defRPr/>
-              </a:pPr>
-              <a:t>7</a:t>
-            </a:fld>
+              <a:t>Chef Software, Inc.</a:t>
+            </a:r>
             <a:endParaRPr lang="en-US" dirty="0"/>
           </a:p>
         </p:txBody>
@@ -1502,28 +1975,10 @@
             <a:pPr>
               <a:defRPr/>
             </a:pPr>
-            <a:endParaRPr lang="en-US"/>
-          </a:p>
-        </p:txBody>
-      </p:sp>
-      <p:sp>
-        <p:nvSpPr>
-          <p:cNvPr id="6" name="Footer Placeholder 5"/>
-          <p:cNvSpPr>
-            <a:spLocks noGrp="1"/>
-          </p:cNvSpPr>
-          <p:nvPr>
-            <p:ph type="ftr" sz="quarter" idx="12"/>
-          </p:nvPr>
-        </p:nvSpPr>
-        <p:spPr/>
-        <p:txBody>
-          <a:bodyPr/>
-          <a:lstStyle/>
-          <a:p>
-            <a:pPr>
-              <a:defRPr/>
-            </a:pPr>
+            <a:r>
+              <a:rPr lang="en-US" smtClean="0"/>
+              <a:t>Elegant Tests</a:t>
+            </a:r>
             <a:endParaRPr lang="en-US"/>
           </a:p>
         </p:txBody>
@@ -1531,7 +1986,7 @@
     </p:spTree>
     <p:extLst>
       <p:ext uri="{BB962C8B-B14F-4D97-AF65-F5344CB8AC3E}">
-        <p14:creationId xmlns:p14="http://schemas.microsoft.com/office/powerpoint/2010/main" val="103301370"/>
+        <p14:creationId xmlns:p14="http://schemas.microsoft.com/office/powerpoint/2010/main" val="1573590349"/>
       </p:ext>
     </p:extLst>
   </p:cSld>
@@ -1585,18 +2040,30 @@
           <a:bodyPr/>
           <a:lstStyle/>
           <a:p>
+            <a:r>
+              <a:rPr lang="en-US" dirty="0" smtClean="0"/>
+              <a:t>Now it is time to demonstrate how </a:t>
+            </a:r>
+            <a:r>
+              <a:rPr lang="en-US" dirty="0" err="1" smtClean="0"/>
+              <a:t>shared_context</a:t>
+            </a:r>
+            <a:r>
+              <a:rPr lang="en-US" dirty="0" smtClean="0"/>
+              <a:t> can be used to collect up all these helpers into a single context that we can apply to example group and possible future example groups that we create.</a:t>
+            </a:r>
             <a:endParaRPr lang="en-US" dirty="0"/>
           </a:p>
         </p:txBody>
       </p:sp>
       <p:sp>
         <p:nvSpPr>
-          <p:cNvPr id="4" name="Slide Number Placeholder 3"/>
+          <p:cNvPr id="5" name="Header Placeholder 4"/>
           <p:cNvSpPr>
             <a:spLocks noGrp="1"/>
           </p:cNvSpPr>
           <p:nvPr>
-            <p:ph type="sldNum" sz="quarter" idx="10"/>
+            <p:ph type="hdr" sz="quarter" idx="11"/>
           </p:nvPr>
         </p:nvSpPr>
         <p:spPr/>
@@ -1607,25 +2074,22 @@
             <a:pPr>
               <a:defRPr/>
             </a:pPr>
-            <a:fld id="{DC3734AA-3150-D947-AC52-2F5DF48BFCD5}" type="slidenum">
+            <a:r>
               <a:rPr lang="en-US" smtClean="0"/>
-              <a:pPr>
-                <a:defRPr/>
-              </a:pPr>
-              <a:t>11</a:t>
-            </a:fld>
-            <a:endParaRPr lang="en-US" dirty="0"/>
-          </a:p>
-        </p:txBody>
-      </p:sp>
-      <p:sp>
-        <p:nvSpPr>
-          <p:cNvPr id="5" name="Header Placeholder 4"/>
+              <a:t>Elegant Tests</a:t>
+            </a:r>
+            <a:endParaRPr lang="en-US"/>
+          </a:p>
+        </p:txBody>
+      </p:sp>
+      <p:sp>
+        <p:nvSpPr>
+          <p:cNvPr id="7" name="Date Placeholder 6"/>
           <p:cNvSpPr>
             <a:spLocks noGrp="1"/>
           </p:cNvSpPr>
           <p:nvPr>
-            <p:ph type="hdr" sz="quarter" idx="11"/>
+            <p:ph type="dt" idx="13"/>
           </p:nvPr>
         </p:nvSpPr>
         <p:spPr/>
@@ -1636,29 +2100,11 @@
             <a:pPr>
               <a:defRPr/>
             </a:pPr>
-            <a:endParaRPr lang="en-US"/>
-          </a:p>
-        </p:txBody>
-      </p:sp>
-      <p:sp>
-        <p:nvSpPr>
-          <p:cNvPr id="6" name="Footer Placeholder 5"/>
-          <p:cNvSpPr>
-            <a:spLocks noGrp="1"/>
-          </p:cNvSpPr>
-          <p:nvPr>
-            <p:ph type="ftr" sz="quarter" idx="12"/>
-          </p:nvPr>
-        </p:nvSpPr>
-        <p:spPr/>
-        <p:txBody>
-          <a:bodyPr/>
-          <a:lstStyle/>
-          <a:p>
-            <a:pPr>
-              <a:defRPr/>
-            </a:pPr>
-            <a:endParaRPr lang="en-US"/>
+            <a:r>
+              <a:rPr lang="en-US" smtClean="0"/>
+              <a:t>Chef Software, Inc.</a:t>
+            </a:r>
+            <a:endParaRPr lang="en-US" dirty="0"/>
           </a:p>
         </p:txBody>
       </p:sp>
@@ -1719,18 +2165,38 @@
           <a:bodyPr/>
           <a:lstStyle/>
           <a:p>
+            <a:r>
+              <a:rPr lang="en-US" dirty="0" smtClean="0"/>
+              <a:t>In this </a:t>
+            </a:r>
+            <a:r>
+              <a:rPr lang="en-US" dirty="0" err="1" smtClean="0"/>
+              <a:t>demonstartion</a:t>
+            </a:r>
+            <a:r>
+              <a:rPr lang="en-US" dirty="0" smtClean="0"/>
+              <a:t> I will show you how to define a </a:t>
+            </a:r>
+            <a:r>
+              <a:rPr lang="en-US" dirty="0" err="1" smtClean="0"/>
+              <a:t>shared_context</a:t>
+            </a:r>
+            <a:r>
+              <a:rPr lang="en-US" dirty="0" smtClean="0"/>
+              <a:t>, move the existing helpers into this context, and then apply this context to a example group.</a:t>
+            </a:r>
             <a:endParaRPr lang="en-US" dirty="0"/>
           </a:p>
         </p:txBody>
       </p:sp>
       <p:sp>
         <p:nvSpPr>
-          <p:cNvPr id="4" name="Slide Number Placeholder 3"/>
+          <p:cNvPr id="4" name="Date Placeholder 3"/>
           <p:cNvSpPr>
             <a:spLocks noGrp="1"/>
           </p:cNvSpPr>
           <p:nvPr>
-            <p:ph type="sldNum" sz="quarter" idx="10"/>
+            <p:ph type="dt" idx="10"/>
           </p:nvPr>
         </p:nvSpPr>
         <p:spPr/>
@@ -1741,13 +2207,10 @@
             <a:pPr>
               <a:defRPr/>
             </a:pPr>
-            <a:fld id="{DC3734AA-3150-D947-AC52-2F5DF48BFCD5}" type="slidenum">
+            <a:r>
               <a:rPr lang="en-US" smtClean="0"/>
-              <a:pPr>
-                <a:defRPr/>
-              </a:pPr>
-              <a:t>12</a:t>
-            </a:fld>
+              <a:t>Chef Software, Inc.</a:t>
+            </a:r>
             <a:endParaRPr lang="en-US" dirty="0"/>
           </a:p>
         </p:txBody>
@@ -1770,28 +2233,10 @@
             <a:pPr>
               <a:defRPr/>
             </a:pPr>
-            <a:endParaRPr lang="en-US"/>
-          </a:p>
-        </p:txBody>
-      </p:sp>
-      <p:sp>
-        <p:nvSpPr>
-          <p:cNvPr id="6" name="Footer Placeholder 5"/>
-          <p:cNvSpPr>
-            <a:spLocks noGrp="1"/>
-          </p:cNvSpPr>
-          <p:nvPr>
-            <p:ph type="ftr" sz="quarter" idx="12"/>
-          </p:nvPr>
-        </p:nvSpPr>
-        <p:spPr/>
-        <p:txBody>
-          <a:bodyPr/>
-          <a:lstStyle/>
-          <a:p>
-            <a:pPr>
-              <a:defRPr/>
-            </a:pPr>
+            <a:r>
+              <a:rPr lang="en-US" smtClean="0"/>
+              <a:t>Elegant Tests</a:t>
+            </a:r>
             <a:endParaRPr lang="en-US"/>
           </a:p>
         </p:txBody>
@@ -1799,7 +2244,7 @@
     </p:spTree>
     <p:extLst>
       <p:ext uri="{BB962C8B-B14F-4D97-AF65-F5344CB8AC3E}">
-        <p14:creationId xmlns:p14="http://schemas.microsoft.com/office/powerpoint/2010/main" val="2012494481"/>
+        <p14:creationId xmlns:p14="http://schemas.microsoft.com/office/powerpoint/2010/main" val="2001184529"/>
       </p:ext>
     </p:extLst>
   </p:cSld>
@@ -1859,12 +2304,12 @@
       </p:sp>
       <p:sp>
         <p:nvSpPr>
-          <p:cNvPr id="4" name="Slide Number Placeholder 3"/>
+          <p:cNvPr id="5" name="Header Placeholder 4"/>
           <p:cNvSpPr>
             <a:spLocks noGrp="1"/>
           </p:cNvSpPr>
           <p:nvPr>
-            <p:ph type="sldNum" sz="quarter" idx="10"/>
+            <p:ph type="hdr" sz="quarter" idx="11"/>
           </p:nvPr>
         </p:nvSpPr>
         <p:spPr/>
@@ -1875,25 +2320,22 @@
             <a:pPr>
               <a:defRPr/>
             </a:pPr>
-            <a:fld id="{DC3734AA-3150-D947-AC52-2F5DF48BFCD5}" type="slidenum">
+            <a:r>
               <a:rPr lang="en-US" smtClean="0"/>
-              <a:pPr>
-                <a:defRPr/>
-              </a:pPr>
-              <a:t>13</a:t>
-            </a:fld>
-            <a:endParaRPr lang="en-US" dirty="0"/>
-          </a:p>
-        </p:txBody>
-      </p:sp>
-      <p:sp>
-        <p:nvSpPr>
-          <p:cNvPr id="5" name="Header Placeholder 4"/>
+              <a:t>Elegant Tests</a:t>
+            </a:r>
+            <a:endParaRPr lang="en-US"/>
+          </a:p>
+        </p:txBody>
+      </p:sp>
+      <p:sp>
+        <p:nvSpPr>
+          <p:cNvPr id="7" name="Date Placeholder 6"/>
           <p:cNvSpPr>
             <a:spLocks noGrp="1"/>
           </p:cNvSpPr>
           <p:nvPr>
-            <p:ph type="hdr" sz="quarter" idx="11"/>
+            <p:ph type="dt" idx="13"/>
           </p:nvPr>
         </p:nvSpPr>
         <p:spPr/>
@@ -1904,29 +2346,11 @@
             <a:pPr>
               <a:defRPr/>
             </a:pPr>
-            <a:endParaRPr lang="en-US"/>
-          </a:p>
-        </p:txBody>
-      </p:sp>
-      <p:sp>
-        <p:nvSpPr>
-          <p:cNvPr id="6" name="Footer Placeholder 5"/>
-          <p:cNvSpPr>
-            <a:spLocks noGrp="1"/>
-          </p:cNvSpPr>
-          <p:nvPr>
-            <p:ph type="ftr" sz="quarter" idx="12"/>
-          </p:nvPr>
-        </p:nvSpPr>
-        <p:spPr/>
-        <p:txBody>
-          <a:bodyPr/>
-          <a:lstStyle/>
-          <a:p>
-            <a:pPr>
-              <a:defRPr/>
-            </a:pPr>
-            <a:endParaRPr lang="en-US"/>
+            <a:r>
+              <a:rPr lang="en-US" smtClean="0"/>
+              <a:t>Chef Software, Inc.</a:t>
+            </a:r>
+            <a:endParaRPr lang="en-US" dirty="0"/>
           </a:p>
         </p:txBody>
       </p:sp>
@@ -1934,6 +2358,123 @@
     <p:extLst>
       <p:ext uri="{BB962C8B-B14F-4D97-AF65-F5344CB8AC3E}">
         <p14:creationId xmlns:p14="http://schemas.microsoft.com/office/powerpoint/2010/main" val="103301370"/>
+      </p:ext>
+    </p:extLst>
+  </p:cSld>
+  <p:clrMapOvr>
+    <a:masterClrMapping/>
+  </p:clrMapOvr>
+</p:notes>
+</file>
+
+<file path=ppt/notesSlides/notesSlide9.xml><?xml version="1.0" encoding="utf-8"?>
+<p:notes xmlns:a="http://schemas.openxmlformats.org/drawingml/2006/main" xmlns:r="http://schemas.openxmlformats.org/officeDocument/2006/relationships" xmlns:p="http://schemas.openxmlformats.org/presentationml/2006/main">
+  <p:cSld>
+    <p:spTree>
+      <p:nvGrpSpPr>
+        <p:cNvPr id="1" name=""/>
+        <p:cNvGrpSpPr/>
+        <p:nvPr/>
+      </p:nvGrpSpPr>
+      <p:grpSpPr>
+        <a:xfrm>
+          <a:off x="0" y="0"/>
+          <a:ext cx="0" cy="0"/>
+          <a:chOff x="0" y="0"/>
+          <a:chExt cx="0" cy="0"/>
+        </a:xfrm>
+      </p:grpSpPr>
+      <p:sp>
+        <p:nvSpPr>
+          <p:cNvPr id="2" name="Slide Image Placeholder 1"/>
+          <p:cNvSpPr>
+            <a:spLocks noGrp="1" noRot="1" noChangeAspect="1"/>
+          </p:cNvSpPr>
+          <p:nvPr>
+            <p:ph type="sldImg"/>
+          </p:nvPr>
+        </p:nvSpPr>
+        <p:spPr/>
+      </p:sp>
+      <p:sp>
+        <p:nvSpPr>
+          <p:cNvPr id="3" name="Notes Placeholder 2"/>
+          <p:cNvSpPr>
+            <a:spLocks noGrp="1"/>
+          </p:cNvSpPr>
+          <p:nvPr>
+            <p:ph type="body" idx="1"/>
+          </p:nvPr>
+        </p:nvSpPr>
+        <p:spPr/>
+        <p:txBody>
+          <a:bodyPr/>
+          <a:lstStyle/>
+          <a:p>
+            <a:r>
+              <a:rPr lang="en-US" dirty="0" smtClean="0"/>
+              <a:t>As we saw we were creating all these let helpers, methods and shared examples all are focused on the goal of describing a converged recipe. If were to starting thinking about re-using this functionality in other places it would be good to move all these helpers into a single context that we can import wherever we needed it.</a:t>
+            </a:r>
+            <a:endParaRPr lang="en-US" dirty="0"/>
+          </a:p>
+        </p:txBody>
+      </p:sp>
+      <p:sp>
+        <p:nvSpPr>
+          <p:cNvPr id="4" name="Date Placeholder 3"/>
+          <p:cNvSpPr>
+            <a:spLocks noGrp="1"/>
+          </p:cNvSpPr>
+          <p:nvPr>
+            <p:ph type="dt" idx="10"/>
+          </p:nvPr>
+        </p:nvSpPr>
+        <p:spPr/>
+        <p:txBody>
+          <a:bodyPr/>
+          <a:lstStyle/>
+          <a:p>
+            <a:pPr>
+              <a:defRPr/>
+            </a:pPr>
+            <a:r>
+              <a:rPr lang="en-US" smtClean="0"/>
+              <a:t>Chef Software, Inc.</a:t>
+            </a:r>
+            <a:endParaRPr lang="en-US" dirty="0"/>
+          </a:p>
+        </p:txBody>
+      </p:sp>
+      <p:sp>
+        <p:nvSpPr>
+          <p:cNvPr id="5" name="Header Placeholder 4"/>
+          <p:cNvSpPr>
+            <a:spLocks noGrp="1"/>
+          </p:cNvSpPr>
+          <p:nvPr>
+            <p:ph type="hdr" sz="quarter" idx="11"/>
+          </p:nvPr>
+        </p:nvSpPr>
+        <p:spPr/>
+        <p:txBody>
+          <a:bodyPr/>
+          <a:lstStyle/>
+          <a:p>
+            <a:pPr>
+              <a:defRPr/>
+            </a:pPr>
+            <a:r>
+              <a:rPr lang="en-US" smtClean="0"/>
+              <a:t>Elegant Tests</a:t>
+            </a:r>
+            <a:endParaRPr lang="en-US"/>
+          </a:p>
+        </p:txBody>
+      </p:sp>
+    </p:spTree>
+    <p:extLst>
+      <p:ext uri="{BB962C8B-B14F-4D97-AF65-F5344CB8AC3E}">
+        <p14:creationId xmlns:p14="http://schemas.microsoft.com/office/powerpoint/2010/main" val="1982279006"/>
       </p:ext>
     </p:extLst>
   </p:cSld>
@@ -2080,7 +2621,7 @@
   <p:clrMapOvr>
     <a:masterClrMapping/>
   </p:clrMapOvr>
-  <p:transition xmlns:p14="http://schemas.microsoft.com/office/powerpoint/2010/main" spd="med">
+  <p:transition spd="med">
     <p:fade/>
   </p:transition>
 </p:sldLayout>
@@ -2368,7 +2909,7 @@
   <p:clrMapOvr>
     <a:overrideClrMapping bg1="lt1" tx1="dk1" bg2="lt2" tx2="dk2" accent1="accent1" accent2="accent2" accent3="accent3" accent4="accent4" accent5="accent5" accent6="accent6" hlink="hlink" folHlink="folHlink"/>
   </p:clrMapOvr>
-  <p:transition xmlns:p14="http://schemas.microsoft.com/office/powerpoint/2010/main" spd="med">
+  <p:transition spd="med">
     <p:fade/>
   </p:transition>
 </p:sldLayout>
@@ -2663,7 +3204,7 @@
   <p:clrMapOvr>
     <a:overrideClrMapping bg1="lt1" tx1="dk1" bg2="lt2" tx2="dk2" accent1="accent1" accent2="accent2" accent3="accent3" accent4="accent4" accent5="accent5" accent6="accent6" hlink="hlink" folHlink="folHlink"/>
   </p:clrMapOvr>
-  <p:transition xmlns:p14="http://schemas.microsoft.com/office/powerpoint/2010/main" spd="med">
+  <p:transition spd="med">
     <p:fade/>
   </p:transition>
 </p:sldLayout>
@@ -2796,14 +3337,14 @@
           </a:ln>
           <a:extLst>
             <a:ext uri="{909E8E84-426E-40dd-AFC4-6F175D3DCCD1}">
-              <a14:hiddenFill xmlns:a14="http://schemas.microsoft.com/office/drawing/2010/main">
+              <a14:hiddenFill xmlns:a14="http://schemas.microsoft.com/office/drawing/2010/main" xmlns="">
                 <a:solidFill>
                   <a:srgbClr val="FFFFFF"/>
                 </a:solidFill>
               </a14:hiddenFill>
             </a:ext>
             <a:ext uri="{91240B29-F687-4f45-9708-019B960494DF}">
-              <a14:hiddenLine xmlns:a14="http://schemas.microsoft.com/office/drawing/2010/main" w="9525">
+              <a14:hiddenLine xmlns:a14="http://schemas.microsoft.com/office/drawing/2010/main" xmlns="" w="9525">
                 <a:solidFill>
                   <a:srgbClr val="000000"/>
                 </a:solidFill>
@@ -2951,14 +3492,14 @@
           </a:ln>
           <a:extLst>
             <a:ext uri="{909E8E84-426E-40dd-AFC4-6F175D3DCCD1}">
-              <a14:hiddenFill xmlns:a14="http://schemas.microsoft.com/office/drawing/2010/main">
+              <a14:hiddenFill xmlns:a14="http://schemas.microsoft.com/office/drawing/2010/main" xmlns="">
                 <a:solidFill>
                   <a:srgbClr val="FFFFFF"/>
                 </a:solidFill>
               </a14:hiddenFill>
             </a:ext>
             <a:ext uri="{91240B29-F687-4f45-9708-019B960494DF}">
-              <a14:hiddenLine xmlns:a14="http://schemas.microsoft.com/office/drawing/2010/main" w="9525">
+              <a14:hiddenLine xmlns:a14="http://schemas.microsoft.com/office/drawing/2010/main" xmlns="" w="9525">
                 <a:solidFill>
                   <a:srgbClr val="000000"/>
                 </a:solidFill>
@@ -3356,7 +3897,7 @@
   <p:clrMapOvr>
     <a:overrideClrMapping bg1="lt1" tx1="dk1" bg2="lt2" tx2="dk2" accent1="accent1" accent2="accent2" accent3="accent3" accent4="accent4" accent5="accent5" accent6="accent6" hlink="hlink" folHlink="folHlink"/>
   </p:clrMapOvr>
-  <p:transition xmlns:p14="http://schemas.microsoft.com/office/powerpoint/2010/main" spd="med">
+  <p:transition spd="med">
     <p:fade/>
   </p:transition>
 </p:sldLayout>
@@ -3449,14 +3990,14 @@
           </a:ln>
           <a:extLst>
             <a:ext uri="{909E8E84-426E-40dd-AFC4-6F175D3DCCD1}">
-              <a14:hiddenFill xmlns:a14="http://schemas.microsoft.com/office/drawing/2010/main">
+              <a14:hiddenFill xmlns:a14="http://schemas.microsoft.com/office/drawing/2010/main" xmlns="">
                 <a:solidFill>
                   <a:srgbClr val="FFFFFF"/>
                 </a:solidFill>
               </a14:hiddenFill>
             </a:ext>
             <a:ext uri="{91240B29-F687-4f45-9708-019B960494DF}">
-              <a14:hiddenLine xmlns:a14="http://schemas.microsoft.com/office/drawing/2010/main" w="9525">
+              <a14:hiddenLine xmlns:a14="http://schemas.microsoft.com/office/drawing/2010/main" xmlns="" w="9525">
                 <a:solidFill>
                   <a:srgbClr val="000000"/>
                 </a:solidFill>
@@ -3478,7 +4019,7 @@
   <p:clrMapOvr>
     <a:masterClrMapping/>
   </p:clrMapOvr>
-  <p:transition xmlns:p14="http://schemas.microsoft.com/office/powerpoint/2010/main" spd="med">
+  <p:transition spd="med">
     <p:fade/>
   </p:transition>
 </p:sldLayout>
@@ -3765,7 +4306,7 @@
   <p:clrMapOvr>
     <a:masterClrMapping/>
   </p:clrMapOvr>
-  <p:transition xmlns:p14="http://schemas.microsoft.com/office/powerpoint/2010/main" spd="med">
+  <p:transition spd="med">
     <p:fade/>
   </p:transition>
 </p:sldLayout>
@@ -4069,7 +4610,7 @@
   <p:clrMapOvr>
     <a:masterClrMapping/>
   </p:clrMapOvr>
-  <p:transition xmlns:p14="http://schemas.microsoft.com/office/powerpoint/2010/main" spd="med">
+  <p:transition spd="med">
     <p:fade/>
   </p:transition>
 </p:sldLayout>
@@ -4356,7 +4897,7 @@
   <p:clrMapOvr>
     <a:masterClrMapping/>
   </p:clrMapOvr>
-  <p:transition xmlns:p14="http://schemas.microsoft.com/office/powerpoint/2010/main" spd="med">
+  <p:transition spd="med">
     <p:fade/>
   </p:transition>
 </p:sldLayout>
@@ -4660,7 +5201,7 @@
   <p:clrMapOvr>
     <a:masterClrMapping/>
   </p:clrMapOvr>
-  <p:transition xmlns:p14="http://schemas.microsoft.com/office/powerpoint/2010/main" spd="med">
+  <p:transition spd="med">
     <p:fade/>
   </p:transition>
 </p:sldLayout>
@@ -5009,7 +5550,7 @@
   <p:clrMapOvr>
     <a:masterClrMapping/>
   </p:clrMapOvr>
-  <p:transition xmlns:p14="http://schemas.microsoft.com/office/powerpoint/2010/main" spd="med">
+  <p:transition spd="med">
     <p:fade/>
   </p:transition>
 </p:sldLayout>
@@ -5296,7 +5837,7 @@
   <p:clrMapOvr>
     <a:masterClrMapping/>
   </p:clrMapOvr>
-  <p:transition xmlns:p14="http://schemas.microsoft.com/office/powerpoint/2010/main" spd="med">
+  <p:transition spd="med">
     <p:fade/>
   </p:transition>
 </p:sldLayout>
@@ -5545,7 +6086,7 @@
   <p:clrMapOvr>
     <a:masterClrMapping/>
   </p:clrMapOvr>
-  <p:transition xmlns:p14="http://schemas.microsoft.com/office/powerpoint/2010/main" spd="med">
+  <p:transition spd="med">
     <p:fade/>
   </p:transition>
 </p:sldLayout>
@@ -5762,14 +6303,14 @@
           </a:ln>
           <a:extLst>
             <a:ext uri="{909E8E84-426E-40dd-AFC4-6F175D3DCCD1}">
-              <a14:hiddenFill xmlns:a14="http://schemas.microsoft.com/office/drawing/2010/main">
+              <a14:hiddenFill xmlns:a14="http://schemas.microsoft.com/office/drawing/2010/main" xmlns="">
                 <a:solidFill>
                   <a:srgbClr val="FFFFFF"/>
                 </a:solidFill>
               </a14:hiddenFill>
             </a:ext>
             <a:ext uri="{91240B29-F687-4f45-9708-019B960494DF}">
-              <a14:hiddenLine xmlns:a14="http://schemas.microsoft.com/office/drawing/2010/main" w="9525">
+              <a14:hiddenLine xmlns:a14="http://schemas.microsoft.com/office/drawing/2010/main" xmlns="" w="9525">
                 <a:solidFill>
                   <a:srgbClr val="000000"/>
                 </a:solidFill>
@@ -5966,7 +6507,7 @@
   <p:clrMapOvr>
     <a:masterClrMapping/>
   </p:clrMapOvr>
-  <p:transition xmlns:p14="http://schemas.microsoft.com/office/powerpoint/2010/main" spd="med">
+  <p:transition spd="med">
     <p:fade/>
   </p:transition>
 </p:sldLayout>
@@ -6271,7 +6812,7 @@
   <p:clrMapOvr>
     <a:masterClrMapping/>
   </p:clrMapOvr>
-  <p:transition xmlns:p14="http://schemas.microsoft.com/office/powerpoint/2010/main" spd="med">
+  <p:transition spd="med">
     <p:fade/>
   </p:transition>
 </p:sldLayout>
@@ -6583,7 +7124,7 @@
   <p:clrMapOvr>
     <a:masterClrMapping/>
   </p:clrMapOvr>
-  <p:transition xmlns:p14="http://schemas.microsoft.com/office/powerpoint/2010/main" spd="med">
+  <p:transition spd="med">
     <p:fade/>
   </p:transition>
 </p:sldLayout>
@@ -6887,7 +7428,7 @@
   <p:clrMapOvr>
     <a:masterClrMapping/>
   </p:clrMapOvr>
-  <p:transition xmlns:p14="http://schemas.microsoft.com/office/powerpoint/2010/main" spd="med">
+  <p:transition spd="med">
     <p:fade/>
   </p:transition>
 </p:sldLayout>
@@ -7064,7 +7605,7 @@
   <p:clrMapOvr>
     <a:masterClrMapping/>
   </p:clrMapOvr>
-  <p:transition xmlns:p14="http://schemas.microsoft.com/office/powerpoint/2010/main" spd="med">
+  <p:transition spd="med">
     <p:fade/>
   </p:transition>
 </p:sldLayout>
@@ -7140,14 +7681,14 @@
           </a:ln>
           <a:extLst>
             <a:ext uri="{909E8E84-426E-40dd-AFC4-6F175D3DCCD1}">
-              <a14:hiddenFill xmlns:a14="http://schemas.microsoft.com/office/drawing/2010/main">
+              <a14:hiddenFill xmlns:a14="http://schemas.microsoft.com/office/drawing/2010/main" xmlns="">
                 <a:solidFill>
                   <a:srgbClr val="FFFFFF"/>
                 </a:solidFill>
               </a14:hiddenFill>
             </a:ext>
             <a:ext uri="{91240B29-F687-4f45-9708-019B960494DF}">
-              <a14:hiddenLine xmlns:a14="http://schemas.microsoft.com/office/drawing/2010/main" w="9525">
+              <a14:hiddenLine xmlns:a14="http://schemas.microsoft.com/office/drawing/2010/main" xmlns="" w="9525">
                 <a:solidFill>
                   <a:srgbClr val="000000"/>
                 </a:solidFill>
@@ -7423,7 +7964,7 @@
   <p:clrMapOvr>
     <a:overrideClrMapping bg1="lt1" tx1="dk1" bg2="lt2" tx2="dk2" accent1="accent1" accent2="accent2" accent3="accent3" accent4="accent4" accent5="accent5" accent6="accent6" hlink="hlink" folHlink="folHlink"/>
   </p:clrMapOvr>
-  <p:transition xmlns:p14="http://schemas.microsoft.com/office/powerpoint/2010/main" spd="med">
+  <p:transition spd="med">
     <p:fade/>
   </p:transition>
 </p:sldLayout>
@@ -7629,7 +8170,7 @@
   <p:clrMapOvr>
     <a:overrideClrMapping bg1="lt1" tx1="dk1" bg2="lt2" tx2="dk2" accent1="accent1" accent2="accent2" accent3="accent3" accent4="accent4" accent5="accent5" accent6="accent6" hlink="hlink" folHlink="folHlink"/>
   </p:clrMapOvr>
-  <p:transition xmlns:p14="http://schemas.microsoft.com/office/powerpoint/2010/main" spd="med">
+  <p:transition spd="med">
     <p:fade/>
   </p:transition>
 </p:sldLayout>
@@ -7705,14 +8246,14 @@
           </a:ln>
           <a:extLst>
             <a:ext uri="{909E8E84-426E-40dd-AFC4-6F175D3DCCD1}">
-              <a14:hiddenFill xmlns:a14="http://schemas.microsoft.com/office/drawing/2010/main">
+              <a14:hiddenFill xmlns:a14="http://schemas.microsoft.com/office/drawing/2010/main" xmlns="">
                 <a:solidFill>
                   <a:srgbClr val="FFFFFF"/>
                 </a:solidFill>
               </a14:hiddenFill>
             </a:ext>
             <a:ext uri="{91240B29-F687-4f45-9708-019B960494DF}">
-              <a14:hiddenLine xmlns:a14="http://schemas.microsoft.com/office/drawing/2010/main" w="9525">
+              <a14:hiddenLine xmlns:a14="http://schemas.microsoft.com/office/drawing/2010/main" xmlns="" w="9525">
                 <a:solidFill>
                   <a:srgbClr val="000000"/>
                 </a:solidFill>
@@ -7995,7 +8536,7 @@
   <p:clrMapOvr>
     <a:overrideClrMapping bg1="lt1" tx1="dk1" bg2="lt2" tx2="dk2" accent1="accent1" accent2="accent2" accent3="accent3" accent4="accent4" accent5="accent5" accent6="accent6" hlink="hlink" folHlink="folHlink"/>
   </p:clrMapOvr>
-  <p:transition xmlns:p14="http://schemas.microsoft.com/office/powerpoint/2010/main" spd="med">
+  <p:transition spd="med">
     <p:fade/>
   </p:transition>
 </p:sldLayout>
@@ -8203,7 +8744,7 @@
   <p:clrMapOvr>
     <a:overrideClrMapping bg1="lt1" tx1="dk1" bg2="lt2" tx2="dk2" accent1="accent1" accent2="accent2" accent3="accent3" accent4="accent4" accent5="accent5" accent6="accent6" hlink="hlink" folHlink="folHlink"/>
   </p:clrMapOvr>
-  <p:transition xmlns:p14="http://schemas.microsoft.com/office/powerpoint/2010/main" spd="med">
+  <p:transition spd="med">
     <p:fade/>
   </p:transition>
 </p:sldLayout>
@@ -8279,14 +8820,14 @@
           </a:ln>
           <a:extLst>
             <a:ext uri="{909E8E84-426E-40dd-AFC4-6F175D3DCCD1}">
-              <a14:hiddenFill xmlns:a14="http://schemas.microsoft.com/office/drawing/2010/main">
+              <a14:hiddenFill xmlns:a14="http://schemas.microsoft.com/office/drawing/2010/main" xmlns="">
                 <a:solidFill>
                   <a:srgbClr val="FFFFFF"/>
                 </a:solidFill>
               </a14:hiddenFill>
             </a:ext>
             <a:ext uri="{91240B29-F687-4f45-9708-019B960494DF}">
-              <a14:hiddenLine xmlns:a14="http://schemas.microsoft.com/office/drawing/2010/main" w="9525">
+              <a14:hiddenLine xmlns:a14="http://schemas.microsoft.com/office/drawing/2010/main" xmlns="" w="9525">
                 <a:solidFill>
                   <a:srgbClr val="000000"/>
                 </a:solidFill>
@@ -8554,7 +9095,7 @@
   <p:clrMapOvr>
     <a:overrideClrMapping bg1="lt1" tx1="dk1" bg2="lt2" tx2="dk2" accent1="accent1" accent2="accent2" accent3="accent3" accent4="accent4" accent5="accent5" accent6="accent6" hlink="hlink" folHlink="folHlink"/>
   </p:clrMapOvr>
-  <p:transition xmlns:p14="http://schemas.microsoft.com/office/powerpoint/2010/main" spd="med">
+  <p:transition spd="med">
     <p:fade/>
   </p:transition>
 </p:sldLayout>
@@ -8782,7 +9323,7 @@
   <p:clrMapOvr>
     <a:overrideClrMapping bg1="lt1" tx1="dk1" bg2="lt2" tx2="dk2" accent1="accent1" accent2="accent2" accent3="accent3" accent4="accent4" accent5="accent5" accent6="accent6" hlink="hlink" folHlink="folHlink"/>
   </p:clrMapOvr>
-  <p:transition xmlns:p14="http://schemas.microsoft.com/office/powerpoint/2010/main" spd="med">
+  <p:transition spd="med">
     <p:fade/>
   </p:transition>
 </p:sldLayout>
@@ -8938,14 +9479,14 @@
           </a:ln>
           <a:extLst>
             <a:ext uri="{909E8E84-426E-40dd-AFC4-6F175D3DCCD1}">
-              <a14:hiddenFill xmlns:a14="http://schemas.microsoft.com/office/drawing/2010/main">
+              <a14:hiddenFill xmlns:a14="http://schemas.microsoft.com/office/drawing/2010/main" xmlns="">
                 <a:solidFill>
                   <a:srgbClr val="FFFFFF"/>
                 </a:solidFill>
               </a14:hiddenFill>
             </a:ext>
             <a:ext uri="{91240B29-F687-4f45-9708-019B960494DF}">
-              <a14:hiddenLine xmlns:a14="http://schemas.microsoft.com/office/drawing/2010/main" w="9525">
+              <a14:hiddenLine xmlns:a14="http://schemas.microsoft.com/office/drawing/2010/main" xmlns="" w="9525">
                 <a:solidFill>
                   <a:srgbClr val="000000"/>
                 </a:solidFill>
@@ -9044,7 +9585,7 @@
                 <a:ea typeface="+mn-ea"/>
                 <a:cs typeface="+mn-cs"/>
               </a:rPr>
-              <a:t>2016 </a:t>
+              <a:t>2017 </a:t>
             </a:r>
             <a:r>
               <a:rPr lang="en-US" dirty="0">
@@ -9123,7 +9664,7 @@
                 <a:ea typeface="+mn-ea"/>
                 <a:cs typeface="+mn-cs"/>
               </a:rPr>
-              <a:t>3</a:t>
+              <a:t>6</a:t>
             </a:r>
             <a:r>
               <a:rPr lang="en-US" dirty="0" smtClean="0">
@@ -9137,7 +9678,7 @@
               <a:t>-</a:t>
             </a:r>
             <a:fld id="{F0B79B2F-E1DD-4D43-95B3-EA08C411D807}" type="slidenum">
-              <a:rPr lang="en-US">
+              <a:rPr lang="en-US" smtClean="0">
                 <a:solidFill>
                   <a:srgbClr val="7F7F7F"/>
                 </a:solidFill>
@@ -9187,13 +9728,13 @@
     <p:sldLayoutId id="2147483868" r:id="rId14"/>
     <p:sldLayoutId id="2147483869" r:id="rId15"/>
   </p:sldLayoutIdLst>
-  <p:transition xmlns:p14="http://schemas.microsoft.com/office/powerpoint/2010/main" spd="med">
+  <p:transition spd="med">
     <p:fade/>
   </p:transition>
   <p:timing>
     <p:tnLst>
       <p:par>
-        <p:cTn xmlns:p14="http://schemas.microsoft.com/office/powerpoint/2010/main" id="1" dur="indefinite" restart="never" nodeType="tmRoot"/>
+        <p:cTn id="1" dur="indefinite" restart="never" nodeType="tmRoot"/>
       </p:par>
     </p:tnLst>
   </p:timing>
@@ -9721,14 +10262,14 @@
           </a:ln>
           <a:extLst>
             <a:ext uri="{909E8E84-426E-40dd-AFC4-6F175D3DCCD1}">
-              <a14:hiddenFill xmlns:a14="http://schemas.microsoft.com/office/drawing/2010/main">
+              <a14:hiddenFill xmlns:a14="http://schemas.microsoft.com/office/drawing/2010/main" xmlns="">
                 <a:solidFill>
                   <a:srgbClr val="FFFFFF"/>
                 </a:solidFill>
               </a14:hiddenFill>
             </a:ext>
             <a:ext uri="{91240B29-F687-4f45-9708-019B960494DF}">
-              <a14:hiddenLine xmlns:a14="http://schemas.microsoft.com/office/drawing/2010/main" w="9525">
+              <a14:hiddenLine xmlns:a14="http://schemas.microsoft.com/office/drawing/2010/main" xmlns="" w="9525">
                 <a:solidFill>
                   <a:srgbClr val="000000"/>
                 </a:solidFill>
@@ -9827,7 +10368,7 @@
                 <a:ea typeface="+mn-ea"/>
                 <a:cs typeface="+mn-cs"/>
               </a:rPr>
-              <a:t>2016 </a:t>
+              <a:t>2017 </a:t>
             </a:r>
             <a:r>
               <a:rPr lang="en-US" dirty="0">
@@ -9906,7 +10447,7 @@
                 <a:ea typeface="+mn-ea"/>
                 <a:cs typeface="+mn-cs"/>
               </a:rPr>
-              <a:t>3</a:t>
+              <a:t>6</a:t>
             </a:r>
             <a:r>
               <a:rPr lang="en-US" dirty="0" smtClean="0">
@@ -9920,7 +10461,7 @@
               <a:t>-</a:t>
             </a:r>
             <a:fld id="{F0B79B2F-E1DD-4D43-95B3-EA08C411D807}" type="slidenum">
-              <a:rPr lang="en-US">
+              <a:rPr lang="en-US" smtClean="0">
                 <a:solidFill>
                   <a:srgbClr val="7F7F7F"/>
                 </a:solidFill>
@@ -10038,13 +10579,13 @@
     <p:sldLayoutId id="2147483856" r:id="rId7"/>
     <p:sldLayoutId id="2147483866" r:id="rId8"/>
   </p:sldLayoutIdLst>
-  <p:transition xmlns:p14="http://schemas.microsoft.com/office/powerpoint/2010/main" spd="med">
+  <p:transition spd="med">
     <p:fade/>
   </p:transition>
   <p:timing>
     <p:tnLst>
       <p:par>
-        <p:cTn xmlns:p14="http://schemas.microsoft.com/office/powerpoint/2010/main" id="1" dur="indefinite" restart="never" nodeType="tmRoot"/>
+        <p:cTn id="1" dur="indefinite" restart="never" nodeType="tmRoot"/>
       </p:par>
     </p:tnLst>
   </p:timing>
@@ -10619,14 +11160,14 @@
           </a:ln>
           <a:extLst>
             <a:ext uri="{909E8E84-426E-40dd-AFC4-6F175D3DCCD1}">
-              <a14:hiddenFill xmlns:a14="http://schemas.microsoft.com/office/drawing/2010/main">
+              <a14:hiddenFill xmlns:a14="http://schemas.microsoft.com/office/drawing/2010/main" xmlns="">
                 <a:solidFill>
                   <a:srgbClr val="FFFFFF"/>
                 </a:solidFill>
               </a14:hiddenFill>
             </a:ext>
             <a:ext uri="{91240B29-F687-4f45-9708-019B960494DF}">
-              <a14:hiddenLine xmlns:a14="http://schemas.microsoft.com/office/drawing/2010/main" w="9525">
+              <a14:hiddenLine xmlns:a14="http://schemas.microsoft.com/office/drawing/2010/main" xmlns="" w="9525">
                 <a:solidFill>
                   <a:srgbClr val="000000"/>
                 </a:solidFill>
@@ -10860,13 +11401,13 @@
   <p:clrMapOvr>
     <a:masterClrMapping/>
   </p:clrMapOvr>
-  <p:transition xmlns:p14="http://schemas.microsoft.com/office/powerpoint/2010/main" spd="med">
+  <p:transition spd="med">
     <p:fade/>
   </p:transition>
   <p:timing>
     <p:tnLst>
       <p:par>
-        <p:cTn xmlns:p14="http://schemas.microsoft.com/office/powerpoint/2010/main" id="1" dur="indefinite" restart="never" nodeType="tmRoot"/>
+        <p:cTn id="1" dur="indefinite" restart="never" nodeType="tmRoot"/>
       </p:par>
     </p:tnLst>
   </p:timing>
@@ -10926,17 +11467,38 @@
         <p:spPr/>
         <p:txBody>
           <a:bodyPr>
-            <a:normAutofit fontScale="92500" lnSpcReduction="20000"/>
+            <a:normAutofit fontScale="62500" lnSpcReduction="20000"/>
           </a:bodyPr>
           <a:lstStyle/>
           <a:p>
             <a:r>
+              <a:rPr lang="en-US" dirty="0" smtClean="0"/>
+              <a:t>require '</a:t>
+            </a:r>
+            <a:r>
+              <a:rPr lang="en-US" dirty="0" err="1" smtClean="0"/>
+              <a:t>spec_helper</a:t>
+            </a:r>
+            <a:r>
+              <a:rPr lang="en-US" dirty="0" smtClean="0"/>
+              <a:t>'</a:t>
+            </a:r>
+          </a:p>
+          <a:p>
+            <a:endParaRPr lang="en-US" dirty="0" smtClean="0"/>
+          </a:p>
+          <a:p>
+            <a:r>
               <a:rPr lang="en-US" dirty="0" err="1" smtClean="0"/>
               <a:t>shared_context</a:t>
             </a:r>
             <a:r>
               <a:rPr lang="en-US" dirty="0" smtClean="0"/>
-              <a:t> 'converged recipe' do</a:t>
+              <a:t> </a:t>
+            </a:r>
+            <a:r>
+              <a:rPr lang="en-US" dirty="0" smtClean="0"/>
+              <a:t>'converged recipe' do</a:t>
             </a:r>
           </a:p>
           <a:p>
@@ -11139,18 +11701,45 @@
       </p:sp>
       <p:sp>
         <p:nvSpPr>
-          <p:cNvPr id="5" name="Text Placeholder 4"/>
+          <p:cNvPr id="4" name="Text Placeholder 3"/>
           <p:cNvSpPr>
             <a:spLocks noGrp="1"/>
           </p:cNvSpPr>
           <p:nvPr>
-            <p:ph type="body" sz="quarter" idx="12"/>
+            <p:ph type="body" sz="quarter" idx="11"/>
+          </p:nvPr>
+        </p:nvSpPr>
+        <p:spPr/>
+        <p:txBody>
+          <a:bodyPr/>
+          <a:lstStyle/>
+          <a:p>
+            <a:r>
+              <a:rPr lang="en-US" dirty="0" smtClean="0"/>
+              <a:t>~/ark/spec/unit/recipes/</a:t>
+            </a:r>
+            <a:r>
+              <a:rPr lang="en-US" dirty="0" err="1" smtClean="0"/>
+              <a:t>default_spec.rb</a:t>
+            </a:r>
+            <a:endParaRPr lang="en-US" dirty="0"/>
+          </a:p>
+        </p:txBody>
+      </p:sp>
+      <p:sp>
+        <p:nvSpPr>
+          <p:cNvPr id="9" name="Text Placeholder 7"/>
+          <p:cNvSpPr>
+            <a:spLocks noGrp="1"/>
+          </p:cNvSpPr>
+          <p:nvPr>
+            <p:ph type="body" sz="quarter" idx="13"/>
           </p:nvPr>
         </p:nvSpPr>
         <p:spPr>
           <a:xfrm>
-            <a:off x="621430" y="7583714"/>
-            <a:ext cx="14925911" cy="454620"/>
+            <a:off x="1135063" y="2700338"/>
+            <a:ext cx="14404975" cy="3843337"/>
           </a:xfrm>
         </p:spPr>
         <p:txBody>
@@ -11163,18 +11752,18 @@
       </p:sp>
       <p:sp>
         <p:nvSpPr>
-          <p:cNvPr id="6" name="Text Placeholder 4"/>
+          <p:cNvPr id="10" name="Text Placeholder 7"/>
           <p:cNvSpPr>
             <a:spLocks noGrp="1"/>
           </p:cNvSpPr>
           <p:nvPr>
-            <p:ph type="body" sz="quarter" idx="12"/>
+            <p:ph type="body" sz="quarter" idx="13"/>
           </p:nvPr>
         </p:nvSpPr>
         <p:spPr>
           <a:xfrm>
-            <a:off x="621430" y="1366762"/>
-            <a:ext cx="14925911" cy="5019523"/>
+            <a:off x="1149022" y="7500933"/>
+            <a:ext cx="14404975" cy="435833"/>
           </a:xfrm>
         </p:spPr>
         <p:txBody>
@@ -11195,13 +11784,13 @@
   <p:clrMapOvr>
     <a:masterClrMapping/>
   </p:clrMapOvr>
-  <p:transition xmlns:p14="http://schemas.microsoft.com/office/powerpoint/2010/main" spd="med">
+  <p:transition spd="med">
     <p:fade/>
   </p:transition>
   <p:timing>
     <p:tnLst>
       <p:par>
-        <p:cTn xmlns:p14="http://schemas.microsoft.com/office/powerpoint/2010/main" id="1" dur="indefinite" restart="never" nodeType="tmRoot"/>
+        <p:cTn id="1" dur="indefinite" restart="never" nodeType="tmRoot"/>
       </p:par>
     </p:tnLst>
   </p:timing>
@@ -11400,13 +11989,13 @@
   <p:clrMapOvr>
     <a:masterClrMapping/>
   </p:clrMapOvr>
-  <p:transition xmlns:p14="http://schemas.microsoft.com/office/powerpoint/2010/main" spd="med">
+  <p:transition spd="med">
     <p:fade/>
   </p:transition>
   <p:timing>
     <p:tnLst>
       <p:par>
-        <p:cTn xmlns:p14="http://schemas.microsoft.com/office/powerpoint/2010/main" id="1" dur="indefinite" restart="never" nodeType="tmRoot"/>
+        <p:cTn id="1" dur="indefinite" restart="never" nodeType="tmRoot"/>
       </p:par>
     </p:tnLst>
   </p:timing>
@@ -11724,13 +12313,13 @@
   <p:clrMapOvr>
     <a:masterClrMapping/>
   </p:clrMapOvr>
-  <p:transition xmlns:p14="http://schemas.microsoft.com/office/powerpoint/2010/main" spd="med">
+  <p:transition spd="med">
     <p:fade/>
   </p:transition>
   <p:timing>
     <p:tnLst>
       <p:par>
-        <p:cTn xmlns:p14="http://schemas.microsoft.com/office/powerpoint/2010/main" id="1" dur="indefinite" restart="never" nodeType="tmRoot"/>
+        <p:cTn id="1" dur="indefinite" restart="never" nodeType="tmRoot"/>
       </p:par>
     </p:tnLst>
   </p:timing>
@@ -11919,38 +12508,6 @@
           </a:p>
         </p:txBody>
       </p:sp>
-      <p:sp>
-        <p:nvSpPr>
-          <p:cNvPr id="3" name="TextBox 2"/>
-          <p:cNvSpPr txBox="1"/>
-          <p:nvPr/>
-        </p:nvSpPr>
-        <p:spPr bwMode="white">
-          <a:xfrm>
-            <a:off x="582706" y="2345765"/>
-            <a:ext cx="6977529" cy="2166470"/>
-          </a:xfrm>
-          <a:prstGeom prst="rect">
-            <a:avLst/>
-          </a:prstGeom>
-        </p:spPr>
-        <p:txBody>
-          <a:bodyPr vert="horz" wrap="square" lIns="91440" tIns="91440" rIns="91440" bIns="91440" rtlCol="0">
-            <a:normAutofit/>
-          </a:bodyPr>
-          <a:lstStyle/>
-          <a:p>
-            <a:r>
-              <a:rPr lang="en-US" sz="3200" dirty="0" smtClean="0">
-                <a:solidFill>
-                  <a:schemeClr val="bg1"/>
-                </a:solidFill>
-              </a:rPr>
-              <a:t>Motivational thing to say</a:t>
-            </a:r>
-          </a:p>
-        </p:txBody>
-      </p:sp>
     </p:spTree>
     <p:extLst>
       <p:ext uri="{BB962C8B-B14F-4D97-AF65-F5344CB8AC3E}">
@@ -11961,13 +12518,13 @@
   <p:clrMapOvr>
     <a:masterClrMapping/>
   </p:clrMapOvr>
-  <p:transition xmlns:p14="http://schemas.microsoft.com/office/powerpoint/2010/main" spd="med">
+  <p:transition spd="med">
     <p:fade/>
   </p:transition>
   <p:timing>
     <p:tnLst>
       <p:par>
-        <p:cTn xmlns:p14="http://schemas.microsoft.com/office/powerpoint/2010/main" id="1" dur="indefinite" restart="never" nodeType="tmRoot"/>
+        <p:cTn id="1" dur="indefinite" restart="never" nodeType="tmRoot"/>
       </p:par>
     </p:tnLst>
   </p:timing>
@@ -12001,13 +12558,13 @@
   <p:clrMapOvr>
     <a:masterClrMapping/>
   </p:clrMapOvr>
-  <p:transition xmlns:p14="http://schemas.microsoft.com/office/powerpoint/2010/main" spd="med">
+  <p:transition spd="med">
     <p:fade/>
   </p:transition>
   <p:timing>
     <p:tnLst>
       <p:par>
-        <p:cTn xmlns:p14="http://schemas.microsoft.com/office/powerpoint/2010/main" id="1" dur="indefinite" restart="never" nodeType="tmRoot"/>
+        <p:cTn id="1" dur="indefinite" restart="never" nodeType="tmRoot"/>
       </p:par>
     </p:tnLst>
   </p:timing>
@@ -12108,15 +12665,7 @@
                 <a:ea typeface="Apple Chancery" charset="0"/>
                 <a:cs typeface="Apple Chancery" charset="0"/>
               </a:rPr>
-              <a:t>to save all </a:t>
-            </a:r>
-            <a:r>
-              <a:rPr lang="en-US" sz="7200" i="1" dirty="0" smtClean="0">
-                <a:latin typeface="Apple Chancery" charset="0"/>
-                <a:ea typeface="Apple Chancery" charset="0"/>
-                <a:cs typeface="Apple Chancery" charset="0"/>
-              </a:rPr>
-              <a:t>that you wrote.</a:t>
+              <a:t>to save all that you wrote.</a:t>
             </a:r>
           </a:p>
         </p:txBody>
@@ -12349,13 +12898,13 @@
   <p:clrMapOvr>
     <a:masterClrMapping/>
   </p:clrMapOvr>
-  <p:transition xmlns:p14="http://schemas.microsoft.com/office/powerpoint/2010/main" spd="med">
+  <p:transition spd="med">
     <p:fade/>
   </p:transition>
   <p:timing>
     <p:tnLst>
       <p:par>
-        <p:cTn xmlns:p14="http://schemas.microsoft.com/office/powerpoint/2010/main" id="1" dur="indefinite" restart="never" nodeType="tmRoot"/>
+        <p:cTn id="1" dur="indefinite" restart="never" nodeType="tmRoot"/>
       </p:par>
     </p:tnLst>
   </p:timing>
@@ -12554,13 +13103,13 @@
   <p:clrMapOvr>
     <a:masterClrMapping/>
   </p:clrMapOvr>
-  <p:transition xmlns:p14="http://schemas.microsoft.com/office/powerpoint/2010/main" spd="med">
+  <p:transition spd="med">
     <p:fade/>
   </p:transition>
   <p:timing>
     <p:tnLst>
       <p:par>
-        <p:cTn xmlns:p14="http://schemas.microsoft.com/office/powerpoint/2010/main" id="1" dur="indefinite" restart="never" nodeType="tmRoot"/>
+        <p:cTn id="1" dur="indefinite" restart="never" nodeType="tmRoot"/>
       </p:par>
     </p:tnLst>
   </p:timing>
@@ -12602,10 +13151,6 @@
           <a:lstStyle/>
           <a:p>
             <a:r>
-              <a:rPr lang="en-US" sz="6600" dirty="0" smtClean="0"/>
-              <a:t>Ray of </a:t>
-            </a:r>
-            <a:r>
               <a:rPr lang="en-US" sz="6600" dirty="0" err="1" smtClean="0"/>
               <a:t>shared_context</a:t>
             </a:r>
@@ -12633,7 +13178,7 @@
               <a:t>Use </a:t>
             </a:r>
             <a:r>
-              <a:rPr lang="en-US" dirty="0" err="1"/>
+              <a:rPr lang="en-US" b="1" dirty="0" err="1"/>
               <a:t>shared_context</a:t>
             </a:r>
             <a:r>
@@ -12641,16 +13186,20 @@
               <a:t> to define a block that will be evaluated in the context of example groups either explicitly, using </a:t>
             </a:r>
             <a:r>
-              <a:rPr lang="en-US" dirty="0" err="1"/>
+              <a:rPr lang="en-US" b="1" dirty="0" err="1"/>
               <a:t>include_context</a:t>
             </a:r>
             <a:r>
               <a:rPr lang="en-US" dirty="0"/>
-              <a:t>, or implicitly by matching </a:t>
-            </a:r>
-            <a:r>
-              <a:rPr lang="en-US" dirty="0" err="1"/>
-              <a:t>metdata</a:t>
+              <a:t>, or implicitly by </a:t>
+            </a:r>
+            <a:r>
+              <a:rPr lang="en-US"/>
+              <a:t>matching </a:t>
+            </a:r>
+            <a:r>
+              <a:rPr lang="en-US" smtClean="0"/>
+              <a:t>metadata</a:t>
             </a:r>
             <a:r>
               <a:rPr lang="en-US" dirty="0"/>
@@ -12706,13 +13255,13 @@
   <p:clrMapOvr>
     <a:masterClrMapping/>
   </p:clrMapOvr>
-  <p:transition xmlns:p14="http://schemas.microsoft.com/office/powerpoint/2010/main" spd="med">
+  <p:transition spd="med">
     <p:fade/>
   </p:transition>
   <p:timing>
     <p:tnLst>
       <p:par>
-        <p:cTn xmlns:p14="http://schemas.microsoft.com/office/powerpoint/2010/main" id="1" dur="indefinite" restart="never" nodeType="tmRoot"/>
+        <p:cTn id="1" dur="indefinite" restart="never" nodeType="tmRoot"/>
       </p:par>
     </p:tnLst>
   </p:timing>
@@ -12720,6 +13269,614 @@
 </file>
 
 <file path=ppt/slides/slide5.xml><?xml version="1.0" encoding="utf-8"?>
+<p:sld xmlns:a="http://schemas.openxmlformats.org/drawingml/2006/main" xmlns:r="http://schemas.openxmlformats.org/officeDocument/2006/relationships" xmlns:p="http://schemas.openxmlformats.org/presentationml/2006/main">
+  <p:cSld>
+    <p:spTree>
+      <p:nvGrpSpPr>
+        <p:cNvPr id="1" name=""/>
+        <p:cNvGrpSpPr/>
+        <p:nvPr/>
+      </p:nvGrpSpPr>
+      <p:grpSpPr>
+        <a:xfrm>
+          <a:off x="0" y="0"/>
+          <a:ext cx="0" cy="0"/>
+          <a:chOff x="0" y="0"/>
+          <a:chExt cx="0" cy="0"/>
+        </a:xfrm>
+      </p:grpSpPr>
+      <p:sp>
+        <p:nvSpPr>
+          <p:cNvPr id="2" name="Title 1"/>
+          <p:cNvSpPr>
+            <a:spLocks noGrp="1"/>
+          </p:cNvSpPr>
+          <p:nvPr>
+            <p:ph type="title"/>
+          </p:nvPr>
+        </p:nvSpPr>
+        <p:spPr/>
+        <p:txBody>
+          <a:bodyPr/>
+          <a:lstStyle/>
+          <a:p>
+            <a:r>
+              <a:rPr lang="en-US" dirty="0" smtClean="0"/>
+              <a:t>The Sum of All These 'Helpers'</a:t>
+            </a:r>
+            <a:endParaRPr lang="en-US" dirty="0"/>
+          </a:p>
+        </p:txBody>
+      </p:sp>
+      <p:sp>
+        <p:nvSpPr>
+          <p:cNvPr id="5" name="Rectangle 4"/>
+          <p:cNvSpPr/>
+          <p:nvPr/>
+        </p:nvSpPr>
+        <p:spPr bwMode="auto">
+          <a:xfrm>
+            <a:off x="8928847" y="1891553"/>
+            <a:ext cx="4972891" cy="5360894"/>
+          </a:xfrm>
+          <a:prstGeom prst="rect">
+            <a:avLst/>
+          </a:prstGeom>
+          <a:solidFill>
+            <a:schemeClr val="accent1"/>
+          </a:solidFill>
+          <a:ln>
+            <a:noFill/>
+            <a:headEnd type="none" w="med" len="med"/>
+            <a:tailEnd type="none" w="med" len="med"/>
+          </a:ln>
+          <a:effectLst/>
+        </p:spPr>
+        <p:style>
+          <a:lnRef idx="1">
+            <a:schemeClr val="accent4"/>
+          </a:lnRef>
+          <a:fillRef idx="3">
+            <a:schemeClr val="accent4"/>
+          </a:fillRef>
+          <a:effectRef idx="2">
+            <a:schemeClr val="accent4"/>
+          </a:effectRef>
+          <a:fontRef idx="minor">
+            <a:schemeClr val="lt1"/>
+          </a:fontRef>
+        </p:style>
+        <p:txBody>
+          <a:bodyPr vert="horz" wrap="square" lIns="365760" tIns="274320" rIns="274320" bIns="45718" numCol="1" rtlCol="0" anchor="t" anchorCtr="0" compatLnSpc="1">
+            <a:prstTxWarp prst="textNoShape">
+              <a:avLst/>
+            </a:prstTxWarp>
+          </a:bodyPr>
+          <a:lstStyle/>
+          <a:p>
+            <a:pPr defTabSz="914099"/>
+            <a:r>
+              <a:rPr lang="en-US" b="1" dirty="0" smtClean="0">
+                <a:gradFill>
+                  <a:gsLst>
+                    <a:gs pos="0">
+                      <a:srgbClr val="FFFFFF"/>
+                    </a:gs>
+                    <a:gs pos="100000">
+                      <a:srgbClr val="FFFFFF"/>
+                    </a:gs>
+                  </a:gsLst>
+                  <a:lin ang="5400000" scaled="0"/>
+                </a:gradFill>
+              </a:rPr>
+              <a:t>Converging Recipe</a:t>
+            </a:r>
+          </a:p>
+          <a:p>
+            <a:pPr defTabSz="914099"/>
+            <a:endParaRPr lang="en-US" sz="2400" b="1" dirty="0">
+              <a:gradFill>
+                <a:gsLst>
+                  <a:gs pos="0">
+                    <a:srgbClr val="FFFFFF"/>
+                  </a:gs>
+                  <a:gs pos="100000">
+                    <a:srgbClr val="FFFFFF"/>
+                  </a:gs>
+                </a:gsLst>
+                <a:lin ang="5400000" scaled="0"/>
+              </a:gradFill>
+            </a:endParaRPr>
+          </a:p>
+          <a:p>
+            <a:pPr defTabSz="914099"/>
+            <a:r>
+              <a:rPr lang="en-US" dirty="0" smtClean="0">
+                <a:gradFill>
+                  <a:gsLst>
+                    <a:gs pos="0">
+                      <a:srgbClr val="FFFFFF"/>
+                    </a:gs>
+                    <a:gs pos="100000">
+                      <a:srgbClr val="FFFFFF"/>
+                    </a:gs>
+                  </a:gsLst>
+                  <a:lin ang="5400000" scaled="0"/>
+                </a:gradFill>
+              </a:rPr>
+              <a:t>A converged recipe will always have a </a:t>
+            </a:r>
+            <a:r>
+              <a:rPr lang="en-US" dirty="0" err="1" smtClean="0">
+                <a:gradFill>
+                  <a:gsLst>
+                    <a:gs pos="0">
+                      <a:srgbClr val="FFFFFF"/>
+                    </a:gs>
+                    <a:gs pos="100000">
+                      <a:srgbClr val="FFFFFF"/>
+                    </a:gs>
+                  </a:gsLst>
+                  <a:lin ang="5400000" scaled="0"/>
+                </a:gradFill>
+              </a:rPr>
+              <a:t>chef_run</a:t>
+            </a:r>
+            <a:r>
+              <a:rPr lang="en-US" dirty="0" smtClean="0">
+                <a:gradFill>
+                  <a:gsLst>
+                    <a:gs pos="0">
+                      <a:srgbClr val="FFFFFF"/>
+                    </a:gs>
+                    <a:gs pos="100000">
+                      <a:srgbClr val="FFFFFF"/>
+                    </a:gs>
+                  </a:gsLst>
+                  <a:lin ang="5400000" scaled="0"/>
+                </a:gradFill>
+              </a:rPr>
+              <a:t>, a node object and node attributes.</a:t>
+            </a:r>
+          </a:p>
+          <a:p>
+            <a:pPr defTabSz="914099"/>
+            <a:endParaRPr lang="en-US" sz="2400" dirty="0">
+              <a:gradFill>
+                <a:gsLst>
+                  <a:gs pos="0">
+                    <a:srgbClr val="FFFFFF"/>
+                  </a:gs>
+                  <a:gs pos="100000">
+                    <a:srgbClr val="FFFFFF"/>
+                  </a:gs>
+                </a:gsLst>
+                <a:lin ang="5400000" scaled="0"/>
+              </a:gradFill>
+            </a:endParaRPr>
+          </a:p>
+          <a:p>
+            <a:pPr defTabSz="914099"/>
+            <a:r>
+              <a:rPr lang="en-US" dirty="0" smtClean="0">
+                <a:gradFill>
+                  <a:gsLst>
+                    <a:gs pos="0">
+                      <a:srgbClr val="FFFFFF"/>
+                    </a:gs>
+                    <a:gs pos="100000">
+                      <a:srgbClr val="FFFFFF"/>
+                    </a:gs>
+                  </a:gsLst>
+                  <a:lin ang="5400000" scaled="0"/>
+                </a:gradFill>
+              </a:rPr>
+              <a:t>Every platform in this cookbook will install packages; this may not be the case in other cookbooks.</a:t>
+            </a:r>
+            <a:endParaRPr lang="en-US" sz="2400" dirty="0" smtClean="0">
+              <a:gradFill>
+                <a:gsLst>
+                  <a:gs pos="0">
+                    <a:srgbClr val="FFFFFF"/>
+                  </a:gs>
+                  <a:gs pos="100000">
+                    <a:srgbClr val="FFFFFF"/>
+                  </a:gs>
+                </a:gsLst>
+                <a:lin ang="5400000" scaled="0"/>
+              </a:gradFill>
+            </a:endParaRPr>
+          </a:p>
+        </p:txBody>
+      </p:sp>
+      <p:sp>
+        <p:nvSpPr>
+          <p:cNvPr id="7" name="Rectangle 6"/>
+          <p:cNvSpPr/>
+          <p:nvPr/>
+        </p:nvSpPr>
+        <p:spPr bwMode="auto">
+          <a:xfrm>
+            <a:off x="1213879" y="2889430"/>
+            <a:ext cx="2886635" cy="663388"/>
+          </a:xfrm>
+          <a:prstGeom prst="rect">
+            <a:avLst/>
+          </a:prstGeom>
+          <a:solidFill>
+            <a:schemeClr val="accent4"/>
+          </a:solidFill>
+          <a:ln>
+            <a:noFill/>
+            <a:headEnd type="none" w="med" len="med"/>
+            <a:tailEnd type="none" w="med" len="med"/>
+          </a:ln>
+          <a:effectLst/>
+        </p:spPr>
+        <p:style>
+          <a:lnRef idx="1">
+            <a:schemeClr val="accent4"/>
+          </a:lnRef>
+          <a:fillRef idx="3">
+            <a:schemeClr val="accent4"/>
+          </a:fillRef>
+          <a:effectRef idx="2">
+            <a:schemeClr val="accent4"/>
+          </a:effectRef>
+          <a:fontRef idx="minor">
+            <a:schemeClr val="lt1"/>
+          </a:fontRef>
+        </p:style>
+        <p:txBody>
+          <a:bodyPr vert="horz" wrap="square" lIns="91436" tIns="45718" rIns="91436" bIns="45718" numCol="1" rtlCol="0" anchor="ctr" anchorCtr="0" compatLnSpc="1">
+            <a:prstTxWarp prst="textNoShape">
+              <a:avLst/>
+            </a:prstTxWarp>
+          </a:bodyPr>
+          <a:lstStyle/>
+          <a:p>
+            <a:pPr algn="ctr" defTabSz="914099"/>
+            <a:r>
+              <a:rPr lang="en-US" sz="2400" b="1" dirty="0" smtClean="0">
+                <a:gradFill>
+                  <a:gsLst>
+                    <a:gs pos="0">
+                      <a:srgbClr val="FFFFFF"/>
+                    </a:gs>
+                    <a:gs pos="100000">
+                      <a:srgbClr val="FFFFFF"/>
+                    </a:gs>
+                  </a:gsLst>
+                  <a:lin ang="5400000" scaled="0"/>
+                </a:gradFill>
+              </a:rPr>
+              <a:t>let(:</a:t>
+            </a:r>
+            <a:r>
+              <a:rPr lang="en-US" sz="2400" b="1" dirty="0" err="1" smtClean="0">
+                <a:gradFill>
+                  <a:gsLst>
+                    <a:gs pos="0">
+                      <a:srgbClr val="FFFFFF"/>
+                    </a:gs>
+                    <a:gs pos="100000">
+                      <a:srgbClr val="FFFFFF"/>
+                    </a:gs>
+                  </a:gsLst>
+                  <a:lin ang="5400000" scaled="0"/>
+                </a:gradFill>
+              </a:rPr>
+              <a:t>chef_run</a:t>
+            </a:r>
+            <a:r>
+              <a:rPr lang="en-US" sz="2400" b="1" dirty="0" smtClean="0">
+                <a:gradFill>
+                  <a:gsLst>
+                    <a:gs pos="0">
+                      <a:srgbClr val="FFFFFF"/>
+                    </a:gs>
+                    <a:gs pos="100000">
+                      <a:srgbClr val="FFFFFF"/>
+                    </a:gs>
+                  </a:gsLst>
+                  <a:lin ang="5400000" scaled="0"/>
+                </a:gradFill>
+              </a:rPr>
+              <a:t>) ...</a:t>
+            </a:r>
+          </a:p>
+        </p:txBody>
+      </p:sp>
+      <p:sp>
+        <p:nvSpPr>
+          <p:cNvPr id="8" name="Rectangle 7"/>
+          <p:cNvSpPr/>
+          <p:nvPr/>
+        </p:nvSpPr>
+        <p:spPr bwMode="auto">
+          <a:xfrm>
+            <a:off x="1209117" y="4727754"/>
+            <a:ext cx="3534335" cy="663388"/>
+          </a:xfrm>
+          <a:prstGeom prst="rect">
+            <a:avLst/>
+          </a:prstGeom>
+          <a:solidFill>
+            <a:schemeClr val="accent5"/>
+          </a:solidFill>
+          <a:ln>
+            <a:noFill/>
+            <a:headEnd type="none" w="med" len="med"/>
+            <a:tailEnd type="none" w="med" len="med"/>
+          </a:ln>
+          <a:effectLst/>
+        </p:spPr>
+        <p:style>
+          <a:lnRef idx="1">
+            <a:schemeClr val="accent4"/>
+          </a:lnRef>
+          <a:fillRef idx="3">
+            <a:schemeClr val="accent4"/>
+          </a:fillRef>
+          <a:effectRef idx="2">
+            <a:schemeClr val="accent4"/>
+          </a:effectRef>
+          <a:fontRef idx="minor">
+            <a:schemeClr val="lt1"/>
+          </a:fontRef>
+        </p:style>
+        <p:txBody>
+          <a:bodyPr vert="horz" wrap="square" lIns="91436" tIns="45718" rIns="91436" bIns="45718" numCol="1" rtlCol="0" anchor="ctr" anchorCtr="0" compatLnSpc="1">
+            <a:prstTxWarp prst="textNoShape">
+              <a:avLst/>
+            </a:prstTxWarp>
+          </a:bodyPr>
+          <a:lstStyle/>
+          <a:p>
+            <a:pPr algn="ctr" defTabSz="914099"/>
+            <a:r>
+              <a:rPr lang="en-US" sz="2400" b="1" dirty="0" err="1" smtClean="0">
+                <a:gradFill>
+                  <a:gsLst>
+                    <a:gs pos="0">
+                      <a:srgbClr val="FFFFFF"/>
+                    </a:gs>
+                    <a:gs pos="100000">
+                      <a:srgbClr val="FFFFFF"/>
+                    </a:gs>
+                  </a:gsLst>
+                  <a:lin ang="5400000" scaled="0"/>
+                </a:gradFill>
+              </a:rPr>
+              <a:t>def</a:t>
+            </a:r>
+            <a:r>
+              <a:rPr lang="en-US" sz="2400" b="1" dirty="0" smtClean="0">
+                <a:gradFill>
+                  <a:gsLst>
+                    <a:gs pos="0">
+                      <a:srgbClr val="FFFFFF"/>
+                    </a:gs>
+                    <a:gs pos="100000">
+                      <a:srgbClr val="FFFFFF"/>
+                    </a:gs>
+                  </a:gsLst>
+                  <a:lin ang="5400000" scaled="0"/>
+                </a:gradFill>
+              </a:rPr>
+              <a:t> attribute(name) ...</a:t>
+            </a:r>
+          </a:p>
+        </p:txBody>
+      </p:sp>
+      <p:sp>
+        <p:nvSpPr>
+          <p:cNvPr id="9" name="Rectangle 8"/>
+          <p:cNvSpPr/>
+          <p:nvPr/>
+        </p:nvSpPr>
+        <p:spPr bwMode="auto">
+          <a:xfrm>
+            <a:off x="1218642" y="5651678"/>
+            <a:ext cx="6196572" cy="663388"/>
+          </a:xfrm>
+          <a:prstGeom prst="rect">
+            <a:avLst/>
+          </a:prstGeom>
+          <a:solidFill>
+            <a:srgbClr val="7030A0"/>
+          </a:solidFill>
+          <a:ln>
+            <a:noFill/>
+            <a:headEnd type="none" w="med" len="med"/>
+            <a:tailEnd type="none" w="med" len="med"/>
+          </a:ln>
+          <a:effectLst/>
+        </p:spPr>
+        <p:style>
+          <a:lnRef idx="1">
+            <a:schemeClr val="accent4"/>
+          </a:lnRef>
+          <a:fillRef idx="3">
+            <a:schemeClr val="accent4"/>
+          </a:fillRef>
+          <a:effectRef idx="2">
+            <a:schemeClr val="accent4"/>
+          </a:effectRef>
+          <a:fontRef idx="minor">
+            <a:schemeClr val="lt1"/>
+          </a:fontRef>
+        </p:style>
+        <p:txBody>
+          <a:bodyPr vert="horz" wrap="square" lIns="91436" tIns="45718" rIns="91436" bIns="45718" numCol="1" rtlCol="0" anchor="ctr" anchorCtr="0" compatLnSpc="1">
+            <a:prstTxWarp prst="textNoShape">
+              <a:avLst/>
+            </a:prstTxWarp>
+          </a:bodyPr>
+          <a:lstStyle/>
+          <a:p>
+            <a:pPr algn="ctr" defTabSz="914099"/>
+            <a:r>
+              <a:rPr lang="en-US" sz="2400" b="1" dirty="0" err="1" smtClean="0">
+                <a:gradFill>
+                  <a:gsLst>
+                    <a:gs pos="0">
+                      <a:srgbClr val="FFFFFF"/>
+                    </a:gs>
+                    <a:gs pos="100000">
+                      <a:srgbClr val="FFFFFF"/>
+                    </a:gs>
+                  </a:gsLst>
+                  <a:lin ang="5400000" scaled="0"/>
+                </a:gradFill>
+              </a:rPr>
+              <a:t>shared_examples</a:t>
+            </a:r>
+            <a:r>
+              <a:rPr lang="en-US" sz="2400" b="1" dirty="0" smtClean="0">
+                <a:gradFill>
+                  <a:gsLst>
+                    <a:gs pos="0">
+                      <a:srgbClr val="FFFFFF"/>
+                    </a:gs>
+                    <a:gs pos="100000">
+                      <a:srgbClr val="FFFFFF"/>
+                    </a:gs>
+                  </a:gsLst>
+                  <a:lin ang="5400000" scaled="0"/>
+                </a:gradFill>
+              </a:rPr>
+              <a:t> 'installs packages' ...</a:t>
+            </a:r>
+          </a:p>
+        </p:txBody>
+      </p:sp>
+      <p:sp>
+        <p:nvSpPr>
+          <p:cNvPr id="10" name="Rectangle 9"/>
+          <p:cNvSpPr/>
+          <p:nvPr/>
+        </p:nvSpPr>
+        <p:spPr bwMode="auto">
+          <a:xfrm>
+            <a:off x="1209116" y="3799069"/>
+            <a:ext cx="2886635" cy="663388"/>
+          </a:xfrm>
+          <a:prstGeom prst="rect">
+            <a:avLst/>
+          </a:prstGeom>
+          <a:solidFill>
+            <a:schemeClr val="accent4"/>
+          </a:solidFill>
+          <a:ln>
+            <a:noFill/>
+            <a:headEnd type="none" w="med" len="med"/>
+            <a:tailEnd type="none" w="med" len="med"/>
+          </a:ln>
+          <a:effectLst/>
+        </p:spPr>
+        <p:style>
+          <a:lnRef idx="1">
+            <a:schemeClr val="accent4"/>
+          </a:lnRef>
+          <a:fillRef idx="3">
+            <a:schemeClr val="accent4"/>
+          </a:fillRef>
+          <a:effectRef idx="2">
+            <a:schemeClr val="accent4"/>
+          </a:effectRef>
+          <a:fontRef idx="minor">
+            <a:schemeClr val="lt1"/>
+          </a:fontRef>
+        </p:style>
+        <p:txBody>
+          <a:bodyPr vert="horz" wrap="square" lIns="91436" tIns="45718" rIns="91436" bIns="45718" numCol="1" rtlCol="0" anchor="ctr" anchorCtr="0" compatLnSpc="1">
+            <a:prstTxWarp prst="textNoShape">
+              <a:avLst/>
+            </a:prstTxWarp>
+          </a:bodyPr>
+          <a:lstStyle/>
+          <a:p>
+            <a:pPr algn="ctr" defTabSz="914099"/>
+            <a:r>
+              <a:rPr lang="en-US" sz="2400" b="1" dirty="0" smtClean="0">
+                <a:gradFill>
+                  <a:gsLst>
+                    <a:gs pos="0">
+                      <a:srgbClr val="FFFFFF"/>
+                    </a:gs>
+                    <a:gs pos="100000">
+                      <a:srgbClr val="FFFFFF"/>
+                    </a:gs>
+                  </a:gsLst>
+                  <a:lin ang="5400000" scaled="0"/>
+                </a:gradFill>
+              </a:rPr>
+              <a:t>let(:node) ...</a:t>
+            </a:r>
+          </a:p>
+        </p:txBody>
+      </p:sp>
+      <p:sp>
+        <p:nvSpPr>
+          <p:cNvPr id="11" name="Right Brace 10"/>
+          <p:cNvSpPr/>
+          <p:nvPr/>
+        </p:nvSpPr>
+        <p:spPr>
+          <a:xfrm>
+            <a:off x="7549357" y="2457450"/>
+            <a:ext cx="1157287" cy="4229100"/>
+          </a:xfrm>
+          <a:prstGeom prst="rightBrace">
+            <a:avLst/>
+          </a:prstGeom>
+          <a:ln w="63500">
+            <a:solidFill>
+              <a:schemeClr val="accent1"/>
+            </a:solidFill>
+          </a:ln>
+        </p:spPr>
+        <p:style>
+          <a:lnRef idx="3">
+            <a:schemeClr val="accent1"/>
+          </a:lnRef>
+          <a:fillRef idx="0">
+            <a:schemeClr val="accent1"/>
+          </a:fillRef>
+          <a:effectRef idx="2">
+            <a:schemeClr val="accent1"/>
+          </a:effectRef>
+          <a:fontRef idx="minor">
+            <a:schemeClr val="tx1"/>
+          </a:fontRef>
+        </p:style>
+        <p:txBody>
+          <a:bodyPr rtlCol="0" anchor="ctr"/>
+          <a:lstStyle/>
+          <a:p>
+            <a:pPr algn="ctr"/>
+            <a:endParaRPr lang="en-US"/>
+          </a:p>
+        </p:txBody>
+      </p:sp>
+    </p:spTree>
+    <p:extLst>
+      <p:ext uri="{BB962C8B-B14F-4D97-AF65-F5344CB8AC3E}">
+        <p14:creationId xmlns:p14="http://schemas.microsoft.com/office/powerpoint/2010/main" val="1961955104"/>
+      </p:ext>
+    </p:extLst>
+  </p:cSld>
+  <p:clrMapOvr>
+    <a:masterClrMapping/>
+  </p:clrMapOvr>
+  <p:transition spd="med">
+    <p:fade/>
+  </p:transition>
+</p:sld>
+</file>
+
+<file path=ppt/slides/slide6.xml><?xml version="1.0" encoding="utf-8"?>
 <p:sld xmlns:a="http://schemas.openxmlformats.org/drawingml/2006/main" xmlns:r="http://schemas.openxmlformats.org/officeDocument/2006/relationships" xmlns:p="http://schemas.openxmlformats.org/presentationml/2006/main">
   <p:cSld>
     <p:spTree>
@@ -12911,20 +14068,20 @@
   <p:clrMapOvr>
     <a:masterClrMapping/>
   </p:clrMapOvr>
-  <p:transition xmlns:p14="http://schemas.microsoft.com/office/powerpoint/2010/main" spd="med">
+  <p:transition spd="med">
     <p:fade/>
   </p:transition>
   <p:timing>
     <p:tnLst>
       <p:par>
-        <p:cTn xmlns:p14="http://schemas.microsoft.com/office/powerpoint/2010/main" id="1" dur="indefinite" restart="never" nodeType="tmRoot"/>
+        <p:cTn id="1" dur="indefinite" restart="never" nodeType="tmRoot"/>
       </p:par>
     </p:tnLst>
   </p:timing>
 </p:sld>
 </file>
 
-<file path=ppt/slides/slide6.xml><?xml version="1.0" encoding="utf-8"?>
+<file path=ppt/slides/slide7.xml><?xml version="1.0" encoding="utf-8"?>
 <p:sld xmlns:a="http://schemas.openxmlformats.org/drawingml/2006/main" xmlns:r="http://schemas.openxmlformats.org/officeDocument/2006/relationships" xmlns:p="http://schemas.openxmlformats.org/presentationml/2006/main">
   <p:cSld>
     <p:spTree>
@@ -12986,7 +14143,7 @@
               <a:rPr lang="en-US" sz="4000" b="1" dirty="0" smtClean="0">
                 <a:latin typeface="Inconsolata"/>
                 <a:cs typeface="Inconsolata"/>
-                <a:hlinkClick r:id="rId2"/>
+                <a:hlinkClick r:id="rId3"/>
               </a:rPr>
               <a:t>https</a:t>
             </a:r>
@@ -12994,7 +14151,7 @@
               <a:rPr lang="en-US" sz="4000" b="1" dirty="0">
                 <a:latin typeface="Inconsolata"/>
                 <a:cs typeface="Inconsolata"/>
-                <a:hlinkClick r:id="rId2"/>
+                <a:hlinkClick r:id="rId3"/>
               </a:rPr>
               <a:t>://goo.gl/</a:t>
             </a:r>
@@ -13002,7 +14159,7 @@
               <a:rPr lang="en-US" sz="4000" b="1" dirty="0" smtClean="0">
                 <a:latin typeface="Inconsolata"/>
                 <a:cs typeface="Inconsolata"/>
-                <a:hlinkClick r:id="rId2"/>
+                <a:hlinkClick r:id="rId3"/>
               </a:rPr>
               <a:t>9mRNlD</a:t>
             </a:r>
@@ -13037,20 +14194,20 @@
   <p:clrMapOvr>
     <a:masterClrMapping/>
   </p:clrMapOvr>
-  <p:transition xmlns:p14="http://schemas.microsoft.com/office/powerpoint/2010/main" spd="med">
+  <p:transition spd="med">
     <p:fade/>
   </p:transition>
   <p:timing>
     <p:tnLst>
       <p:par>
-        <p:cTn xmlns:p14="http://schemas.microsoft.com/office/powerpoint/2010/main" id="1" dur="indefinite" restart="never" nodeType="tmRoot"/>
+        <p:cTn id="1" dur="indefinite" restart="never" nodeType="tmRoot"/>
       </p:par>
     </p:tnLst>
   </p:timing>
 </p:sld>
 </file>
 
-<file path=ppt/slides/slide7.xml><?xml version="1.0" encoding="utf-8"?>
+<file path=ppt/slides/slide8.xml><?xml version="1.0" encoding="utf-8"?>
 <p:sld xmlns:a="http://schemas.openxmlformats.org/drawingml/2006/main" xmlns:r="http://schemas.openxmlformats.org/officeDocument/2006/relationships" xmlns:p="http://schemas.openxmlformats.org/presentationml/2006/main">
   <p:cSld>
     <p:spTree>
@@ -13242,165 +14399,13 @@
   <p:clrMapOvr>
     <a:masterClrMapping/>
   </p:clrMapOvr>
-  <p:transition xmlns:p14="http://schemas.microsoft.com/office/powerpoint/2010/main" spd="med">
+  <p:transition spd="med">
     <p:fade/>
   </p:transition>
   <p:timing>
     <p:tnLst>
       <p:par>
-        <p:cTn xmlns:p14="http://schemas.microsoft.com/office/powerpoint/2010/main" id="1" dur="indefinite" restart="never" nodeType="tmRoot"/>
-      </p:par>
-    </p:tnLst>
-  </p:timing>
-</p:sld>
-</file>
-
-<file path=ppt/slides/slide8.xml><?xml version="1.0" encoding="utf-8"?>
-<p:sld xmlns:a="http://schemas.openxmlformats.org/drawingml/2006/main" xmlns:r="http://schemas.openxmlformats.org/officeDocument/2006/relationships" xmlns:p="http://schemas.openxmlformats.org/presentationml/2006/main">
-  <p:cSld>
-    <p:spTree>
-      <p:nvGrpSpPr>
-        <p:cNvPr id="1" name=""/>
-        <p:cNvGrpSpPr/>
-        <p:nvPr/>
-      </p:nvGrpSpPr>
-      <p:grpSpPr>
-        <a:xfrm>
-          <a:off x="0" y="0"/>
-          <a:ext cx="0" cy="0"/>
-          <a:chOff x="0" y="0"/>
-          <a:chExt cx="0" cy="0"/>
-        </a:xfrm>
-      </p:grpSpPr>
-      <p:sp>
-        <p:nvSpPr>
-          <p:cNvPr id="2" name="Title 1"/>
-          <p:cNvSpPr>
-            <a:spLocks noGrp="1"/>
-          </p:cNvSpPr>
-          <p:nvPr>
-            <p:ph type="ctrTitle"/>
-          </p:nvPr>
-        </p:nvSpPr>
-        <p:spPr/>
-        <p:txBody>
-          <a:bodyPr>
-            <a:normAutofit fontScale="90000"/>
-          </a:bodyPr>
-          <a:lstStyle/>
-          <a:p>
-            <a:r>
-              <a:rPr lang="en-US" sz="6600" dirty="0" smtClean="0"/>
-              <a:t>Ray of </a:t>
-            </a:r>
-            <a:r>
-              <a:rPr lang="en-US" sz="6600" dirty="0" err="1" smtClean="0"/>
-              <a:t>shared_context</a:t>
-            </a:r>
-            <a:endParaRPr lang="en-US" dirty="0"/>
-          </a:p>
-        </p:txBody>
-      </p:sp>
-      <p:sp>
-        <p:nvSpPr>
-          <p:cNvPr id="3" name="Subtitle 2"/>
-          <p:cNvSpPr>
-            <a:spLocks noGrp="1"/>
-          </p:cNvSpPr>
-          <p:nvPr>
-            <p:ph type="subTitle" idx="1"/>
-          </p:nvPr>
-        </p:nvSpPr>
-        <p:spPr/>
-        <p:txBody>
-          <a:bodyPr/>
-          <a:lstStyle/>
-          <a:p>
-            <a:r>
-              <a:rPr lang="en-US" dirty="0"/>
-              <a:t>Use </a:t>
-            </a:r>
-            <a:r>
-              <a:rPr lang="en-US" dirty="0" err="1"/>
-              <a:t>shared_context</a:t>
-            </a:r>
-            <a:r>
-              <a:rPr lang="en-US" dirty="0"/>
-              <a:t> to define a block that will be evaluated in the context of example groups either explicitly, using </a:t>
-            </a:r>
-            <a:r>
-              <a:rPr lang="en-US" dirty="0" err="1"/>
-              <a:t>include_context</a:t>
-            </a:r>
-            <a:r>
-              <a:rPr lang="en-US" dirty="0"/>
-              <a:t>, or implicitly by matching </a:t>
-            </a:r>
-            <a:r>
-              <a:rPr lang="en-US" dirty="0" err="1"/>
-              <a:t>metdata</a:t>
-            </a:r>
-            <a:r>
-              <a:rPr lang="en-US" dirty="0"/>
-              <a:t>.</a:t>
-            </a:r>
-          </a:p>
-        </p:txBody>
-      </p:sp>
-      <p:sp>
-        <p:nvSpPr>
-          <p:cNvPr id="6" name="TextBox 5"/>
-          <p:cNvSpPr txBox="1"/>
-          <p:nvPr/>
-        </p:nvSpPr>
-        <p:spPr bwMode="white">
-          <a:xfrm>
-            <a:off x="1676399" y="7010401"/>
-            <a:ext cx="12310534" cy="914400"/>
-          </a:xfrm>
-          <a:prstGeom prst="rect">
-            <a:avLst/>
-          </a:prstGeom>
-        </p:spPr>
-        <p:txBody>
-          <a:bodyPr vert="horz" wrap="none" lIns="91440" tIns="91440" rIns="91440" bIns="91440" rtlCol="0" anchor="ctr">
-            <a:normAutofit/>
-          </a:bodyPr>
-          <a:lstStyle/>
-          <a:p>
-            <a:pPr algn="ctr"/>
-            <a:r>
-              <a:rPr lang="en-US" sz="3200" dirty="0"/>
-              <a:t>http://</a:t>
-            </a:r>
-            <a:r>
-              <a:rPr lang="en-US" sz="3200" dirty="0" err="1"/>
-              <a:t>goo.gl</a:t>
-            </a:r>
-            <a:r>
-              <a:rPr lang="en-US" sz="3200" dirty="0" smtClean="0"/>
-              <a:t>/R0ujTA</a:t>
-            </a:r>
-          </a:p>
-        </p:txBody>
-      </p:sp>
-    </p:spTree>
-    <p:extLst>
-      <p:ext uri="{BB962C8B-B14F-4D97-AF65-F5344CB8AC3E}">
-        <p14:creationId xmlns:p14="http://schemas.microsoft.com/office/powerpoint/2010/main" val="926142040"/>
-      </p:ext>
-    </p:extLst>
-  </p:cSld>
-  <p:clrMapOvr>
-    <a:masterClrMapping/>
-  </p:clrMapOvr>
-  <p:transition xmlns:p14="http://schemas.microsoft.com/office/powerpoint/2010/main" spd="med">
-    <p:fade/>
-  </p:transition>
-  <p:timing>
-    <p:tnLst>
-      <p:par>
-        <p:cTn xmlns:p14="http://schemas.microsoft.com/office/powerpoint/2010/main" id="1" dur="indefinite" restart="never" nodeType="tmRoot"/>
+        <p:cTn id="1" dur="indefinite" restart="never" nodeType="tmRoot"/>
       </p:par>
     </p:tnLst>
   </p:timing>
@@ -13625,13 +14630,13 @@
   <p:clrMapOvr>
     <a:masterClrMapping/>
   </p:clrMapOvr>
-  <p:transition xmlns:p14="http://schemas.microsoft.com/office/powerpoint/2010/main" spd="med">
+  <p:transition spd="med">
     <p:fade/>
   </p:transition>
   <p:timing>
     <p:tnLst>
       <p:par>
-        <p:cTn xmlns:p14="http://schemas.microsoft.com/office/powerpoint/2010/main" id="1" dur="indefinite" restart="never" nodeType="tmRoot"/>
+        <p:cTn id="1" dur="indefinite" restart="never" nodeType="tmRoot"/>
       </p:par>
     </p:tnLst>
   </p:timing>
@@ -14014,7 +15019,7 @@
   <a:extraClrSchemeLst/>
   <a:extLst>
     <a:ext uri="{05A4C25C-085E-4340-85A3-A5531E510DB2}">
-      <thm15:themeFamily xmlns="" xmlns:thm15="http://schemas.microsoft.com/office/thememl/2012/main" name="Chef-TemplateComps_v09-16x9-Light.potx" id="{078CEFDB-FA7A-4E36-9964-13EF367585CB}" vid="{8B87B0F3-7308-43D5-8388-E1B49EA02652}"/>
+      <thm15:themeFamily xmlns:thm15="http://schemas.microsoft.com/office/thememl/2012/main" name="Chef-TemplateComps_v09-16x9-Light.potx" id="{078CEFDB-FA7A-4E36-9964-13EF367585CB}" vid="{8B87B0F3-7308-43D5-8388-E1B49EA02652}"/>
     </a:ext>
   </a:extLst>
 </a:theme>
@@ -14396,7 +15401,7 @@
   <a:extraClrSchemeLst/>
   <a:extLst>
     <a:ext uri="{05A4C25C-085E-4340-85A3-A5531E510DB2}">
-      <thm15:themeFamily xmlns="" xmlns:thm15="http://schemas.microsoft.com/office/thememl/2012/main" name="Chef-TemplateComps_v09-16x9-Light.potx" id="{078CEFDB-FA7A-4E36-9964-13EF367585CB}" vid="{8B87B0F3-7308-43D5-8388-E1B49EA02652}"/>
+      <thm15:themeFamily xmlns:thm15="http://schemas.microsoft.com/office/thememl/2012/main" name="Chef-TemplateComps_v09-16x9-Light.potx" id="{078CEFDB-FA7A-4E36-9964-13EF367585CB}" vid="{8B87B0F3-7308-43D5-8388-E1B49EA02652}"/>
     </a:ext>
   </a:extLst>
 </a:theme>

</xml_diff>